<commit_message>
outline of non-convex optimization
</commit_message>
<xml_diff>
--- a/notes/optimization.pptx
+++ b/notes/optimization.pptx
@@ -12,14 +12,15 @@
     <p:sldId id="260" r:id="rId6"/>
     <p:sldId id="262" r:id="rId7"/>
     <p:sldId id="263" r:id="rId8"/>
-    <p:sldId id="264" r:id="rId9"/>
-    <p:sldId id="265" r:id="rId10"/>
-    <p:sldId id="266" r:id="rId11"/>
-    <p:sldId id="267" r:id="rId12"/>
-    <p:sldId id="268" r:id="rId13"/>
-    <p:sldId id="270" r:id="rId14"/>
-    <p:sldId id="271" r:id="rId15"/>
-    <p:sldId id="269" r:id="rId16"/>
+    <p:sldId id="340" r:id="rId9"/>
+    <p:sldId id="264" r:id="rId10"/>
+    <p:sldId id="265" r:id="rId11"/>
+    <p:sldId id="266" r:id="rId12"/>
+    <p:sldId id="267" r:id="rId13"/>
+    <p:sldId id="268" r:id="rId14"/>
+    <p:sldId id="270" r:id="rId15"/>
+    <p:sldId id="271" r:id="rId16"/>
+    <p:sldId id="269" r:id="rId17"/>
   </p:sldIdLst>
   <p:sldSz cx="9144000" cy="6858000" type="screen4x3"/>
   <p:notesSz cx="6858000" cy="9144000"/>
@@ -3781,6 +3782,391 @@
 </file>
 
 <file path=ppt/slides/slide10.xml><?xml version="1.0" encoding="utf-8"?>
+<p:sld xmlns:a="http://schemas.openxmlformats.org/drawingml/2006/main" xmlns:r="http://schemas.openxmlformats.org/officeDocument/2006/relationships" xmlns:p="http://schemas.openxmlformats.org/presentationml/2006/main">
+  <p:cSld>
+    <p:spTree>
+      <p:nvGrpSpPr>
+        <p:cNvPr id="1" name=""/>
+        <p:cNvGrpSpPr/>
+        <p:nvPr/>
+      </p:nvGrpSpPr>
+      <p:grpSpPr>
+        <a:xfrm>
+          <a:off x="0" y="0"/>
+          <a:ext cx="0" cy="0"/>
+          <a:chOff x="0" y="0"/>
+          <a:chExt cx="0" cy="0"/>
+        </a:xfrm>
+      </p:grpSpPr>
+      <p:sp>
+        <p:nvSpPr>
+          <p:cNvPr id="21506" name="Rectangle 2">
+            <a:extLst>
+              <a:ext uri="{FF2B5EF4-FFF2-40B4-BE49-F238E27FC236}">
+                <a16:creationId xmlns:a16="http://schemas.microsoft.com/office/drawing/2014/main" id="{3C3E5631-988C-C645-A139-EF0B71FBA641}"/>
+              </a:ext>
+            </a:extLst>
+          </p:cNvPr>
+          <p:cNvSpPr>
+            <a:spLocks noGrp="1" noChangeArrowheads="1"/>
+          </p:cNvSpPr>
+          <p:nvPr>
+            <p:ph type="title"/>
+          </p:nvPr>
+        </p:nvSpPr>
+        <p:spPr>
+          <a:xfrm>
+            <a:off x="685800" y="76200"/>
+            <a:ext cx="7772400" cy="1143000"/>
+          </a:xfrm>
+        </p:spPr>
+        <p:txBody>
+          <a:bodyPr/>
+          <a:lstStyle/>
+          <a:p>
+            <a:pPr eaLnBrk="1" hangingPunct="1"/>
+            <a:r>
+              <a:rPr lang="en-US" altLang="en-US"/>
+              <a:t>Derivatives of </a:t>
+            </a:r>
+            <a:r>
+              <a:rPr lang="en-US" altLang="en-US" i="1"/>
+              <a:t>f</a:t>
+            </a:r>
+            <a:r>
+              <a:rPr lang="en-US" altLang="en-US" i="1" baseline="-25000"/>
+              <a:t>i</a:t>
+            </a:r>
+            <a:endParaRPr lang="en-US" altLang="en-US"/>
+          </a:p>
+        </p:txBody>
+      </p:sp>
+      <p:sp>
+        <p:nvSpPr>
+          <p:cNvPr id="21507" name="Rectangle 3">
+            <a:extLst>
+              <a:ext uri="{FF2B5EF4-FFF2-40B4-BE49-F238E27FC236}">
+                <a16:creationId xmlns:a16="http://schemas.microsoft.com/office/drawing/2014/main" id="{B6F88915-BEC4-FF4E-A4FC-7A2597ECFA36}"/>
+              </a:ext>
+            </a:extLst>
+          </p:cNvPr>
+          <p:cNvSpPr>
+            <a:spLocks noGrp="1" noChangeArrowheads="1"/>
+          </p:cNvSpPr>
+          <p:nvPr>
+            <p:ph type="body" idx="1"/>
+          </p:nvPr>
+        </p:nvSpPr>
+        <p:spPr>
+          <a:xfrm>
+            <a:off x="685800" y="1143000"/>
+            <a:ext cx="7772400" cy="4114800"/>
+          </a:xfrm>
+        </p:spPr>
+        <p:txBody>
+          <a:bodyPr/>
+          <a:lstStyle/>
+          <a:p>
+            <a:pPr eaLnBrk="1" hangingPunct="1">
+              <a:lnSpc>
+                <a:spcPct val="90000"/>
+              </a:lnSpc>
+            </a:pPr>
+            <a:r>
+              <a:rPr lang="en-US" altLang="en-US" sz="2800"/>
+              <a:t>Most-efficient algorithms typically </a:t>
+            </a:r>
+            <a:r>
+              <a:rPr lang="en-US" altLang="en-US" sz="2800">
+                <a:solidFill>
+                  <a:schemeClr val="accent2"/>
+                </a:solidFill>
+              </a:rPr>
+              <a:t>require user to supply the gradients </a:t>
+            </a:r>
+            <a:r>
+              <a:rPr lang="en-US" altLang="en-US" sz="2800">
+                <a:solidFill>
+                  <a:schemeClr val="accent2"/>
+                </a:solidFill>
+                <a:sym typeface="Symbol" pitchFamily="2" charset="2"/>
+              </a:rPr>
+              <a:t></a:t>
+            </a:r>
+            <a:r>
+              <a:rPr lang="en-US" altLang="en-US" sz="2800" i="1" baseline="-25000">
+                <a:solidFill>
+                  <a:schemeClr val="accent2"/>
+                </a:solidFill>
+                <a:sym typeface="Symbol" pitchFamily="2" charset="2"/>
+              </a:rPr>
+              <a:t>x</a:t>
+            </a:r>
+            <a:r>
+              <a:rPr lang="en-US" altLang="en-US" sz="2800" i="1">
+                <a:solidFill>
+                  <a:schemeClr val="accent2"/>
+                </a:solidFill>
+                <a:sym typeface="Symbol" pitchFamily="2" charset="2"/>
+              </a:rPr>
+              <a:t>f</a:t>
+            </a:r>
+            <a:r>
+              <a:rPr lang="en-US" altLang="en-US" sz="2800" i="1" baseline="-25000">
+                <a:solidFill>
+                  <a:schemeClr val="accent2"/>
+                </a:solidFill>
+                <a:sym typeface="Symbol" pitchFamily="2" charset="2"/>
+              </a:rPr>
+              <a:t>i</a:t>
+            </a:r>
+            <a:r>
+              <a:rPr lang="en-US" altLang="en-US" sz="2800" i="1" baseline="-25000">
+                <a:sym typeface="Symbol" pitchFamily="2" charset="2"/>
+              </a:rPr>
+              <a:t> </a:t>
+            </a:r>
+            <a:r>
+              <a:rPr lang="en-US" altLang="en-US" sz="2800"/>
+              <a:t> of objective/constraints </a:t>
+            </a:r>
+          </a:p>
+          <a:p>
+            <a:pPr lvl="1" eaLnBrk="1" hangingPunct="1">
+              <a:lnSpc>
+                <a:spcPct val="90000"/>
+              </a:lnSpc>
+            </a:pPr>
+            <a:r>
+              <a:rPr lang="en-US" altLang="en-US" sz="2400">
+                <a:ea typeface="ＭＳ Ｐゴシック" panose="020B0600070205080204" pitchFamily="34" charset="-128"/>
+              </a:rPr>
+              <a:t>you should </a:t>
+            </a:r>
+            <a:r>
+              <a:rPr lang="en-US" altLang="en-US" sz="2400" i="1">
+                <a:ea typeface="ＭＳ Ｐゴシック" panose="020B0600070205080204" pitchFamily="34" charset="-128"/>
+              </a:rPr>
+              <a:t>always</a:t>
+            </a:r>
+            <a:r>
+              <a:rPr lang="en-US" altLang="en-US" sz="2400">
+                <a:ea typeface="ＭＳ Ｐゴシック" panose="020B0600070205080204" pitchFamily="34" charset="-128"/>
+              </a:rPr>
+              <a:t> compute these analytically</a:t>
+            </a:r>
+          </a:p>
+          <a:p>
+            <a:pPr lvl="2" eaLnBrk="1" hangingPunct="1">
+              <a:lnSpc>
+                <a:spcPct val="90000"/>
+              </a:lnSpc>
+            </a:pPr>
+            <a:r>
+              <a:rPr lang="en-US" altLang="en-US" sz="2000">
+                <a:ea typeface="ＭＳ Ｐゴシック" panose="020B0600070205080204" pitchFamily="34" charset="-128"/>
+              </a:rPr>
+              <a:t>rather than use finite-difference approximations, better to just use a derivative-free optimization algorithm</a:t>
+            </a:r>
+          </a:p>
+          <a:p>
+            <a:pPr lvl="2" eaLnBrk="1" hangingPunct="1">
+              <a:lnSpc>
+                <a:spcPct val="90000"/>
+              </a:lnSpc>
+            </a:pPr>
+            <a:r>
+              <a:rPr lang="en-US" altLang="en-US" sz="2000">
+                <a:ea typeface="ＭＳ Ｐゴシック" panose="020B0600070205080204" pitchFamily="34" charset="-128"/>
+              </a:rPr>
+              <a:t>in principle, one can always compute </a:t>
+            </a:r>
+            <a:r>
+              <a:rPr lang="en-US" altLang="en-US" sz="2000">
+                <a:ea typeface="ＭＳ Ｐゴシック" panose="020B0600070205080204" pitchFamily="34" charset="-128"/>
+                <a:sym typeface="Symbol" pitchFamily="2" charset="2"/>
+              </a:rPr>
+              <a:t></a:t>
+            </a:r>
+            <a:r>
+              <a:rPr lang="en-US" altLang="en-US" sz="2000" i="1" baseline="-25000">
+                <a:ea typeface="ＭＳ Ｐゴシック" panose="020B0600070205080204" pitchFamily="34" charset="-128"/>
+                <a:sym typeface="Symbol" pitchFamily="2" charset="2"/>
+              </a:rPr>
+              <a:t>x</a:t>
+            </a:r>
+            <a:r>
+              <a:rPr lang="en-US" altLang="en-US" sz="2000" i="1">
+                <a:ea typeface="ＭＳ Ｐゴシック" panose="020B0600070205080204" pitchFamily="34" charset="-128"/>
+                <a:sym typeface="Symbol" pitchFamily="2" charset="2"/>
+              </a:rPr>
+              <a:t>f</a:t>
+            </a:r>
+            <a:r>
+              <a:rPr lang="en-US" altLang="en-US" sz="2000" i="1" baseline="-25000">
+                <a:ea typeface="ＭＳ Ｐゴシック" panose="020B0600070205080204" pitchFamily="34" charset="-128"/>
+                <a:sym typeface="Symbol" pitchFamily="2" charset="2"/>
+              </a:rPr>
+              <a:t>i</a:t>
+            </a:r>
+            <a:r>
+              <a:rPr lang="en-US" altLang="en-US" sz="2000">
+                <a:ea typeface="ＭＳ Ｐゴシック" panose="020B0600070205080204" pitchFamily="34" charset="-128"/>
+              </a:rPr>
+              <a:t> with about the same cost as </a:t>
+            </a:r>
+            <a:r>
+              <a:rPr lang="en-US" altLang="en-US" sz="2000" i="1">
+                <a:ea typeface="ＭＳ Ｐゴシック" panose="020B0600070205080204" pitchFamily="34" charset="-128"/>
+              </a:rPr>
+              <a:t>f</a:t>
+            </a:r>
+            <a:r>
+              <a:rPr lang="en-US" altLang="en-US" sz="2000" i="1" baseline="-25000">
+                <a:ea typeface="ＭＳ Ｐゴシック" panose="020B0600070205080204" pitchFamily="34" charset="-128"/>
+              </a:rPr>
+              <a:t>i</a:t>
+            </a:r>
+            <a:r>
+              <a:rPr lang="en-US" altLang="en-US" sz="2000">
+                <a:ea typeface="ＭＳ Ｐゴシック" panose="020B0600070205080204" pitchFamily="34" charset="-128"/>
+              </a:rPr>
+              <a:t>, using </a:t>
+            </a:r>
+            <a:r>
+              <a:rPr lang="en-US" altLang="en-US" sz="2000">
+                <a:solidFill>
+                  <a:srgbClr val="FF0000"/>
+                </a:solidFill>
+                <a:ea typeface="ＭＳ Ｐゴシック" panose="020B0600070205080204" pitchFamily="34" charset="-128"/>
+              </a:rPr>
+              <a:t>adjoint methods</a:t>
+            </a:r>
+            <a:endParaRPr lang="en-US" altLang="en-US" sz="2000">
+              <a:ea typeface="ＭＳ Ｐゴシック" panose="020B0600070205080204" pitchFamily="34" charset="-128"/>
+            </a:endParaRPr>
+          </a:p>
+          <a:p>
+            <a:pPr lvl="1" eaLnBrk="1" hangingPunct="1">
+              <a:lnSpc>
+                <a:spcPct val="90000"/>
+              </a:lnSpc>
+            </a:pPr>
+            <a:r>
+              <a:rPr lang="en-US" altLang="en-US" sz="2400">
+                <a:ea typeface="ＭＳ Ｐゴシック" panose="020B0600070205080204" pitchFamily="34" charset="-128"/>
+              </a:rPr>
+              <a:t>gradient-based methods can find (local) optima of problems with millions of design parameters</a:t>
+            </a:r>
+          </a:p>
+          <a:p>
+            <a:pPr eaLnBrk="1" hangingPunct="1">
+              <a:lnSpc>
+                <a:spcPct val="90000"/>
+              </a:lnSpc>
+            </a:pPr>
+            <a:r>
+              <a:rPr lang="en-US" altLang="en-US" sz="2800">
+                <a:solidFill>
+                  <a:schemeClr val="accent2"/>
+                </a:solidFill>
+              </a:rPr>
+              <a:t>Derivative-free</a:t>
+            </a:r>
+            <a:r>
+              <a:rPr lang="en-US" altLang="en-US" sz="2800"/>
+              <a:t> methods: only require </a:t>
+            </a:r>
+            <a:r>
+              <a:rPr lang="en-US" altLang="en-US" sz="2800" i="1"/>
+              <a:t>f</a:t>
+            </a:r>
+            <a:r>
+              <a:rPr lang="en-US" altLang="en-US" sz="2800" i="1" baseline="-25000"/>
+              <a:t>i</a:t>
+            </a:r>
+            <a:r>
+              <a:rPr lang="en-US" altLang="en-US" sz="2800"/>
+              <a:t> values</a:t>
+            </a:r>
+          </a:p>
+          <a:p>
+            <a:pPr lvl="1" eaLnBrk="1" hangingPunct="1">
+              <a:lnSpc>
+                <a:spcPct val="90000"/>
+              </a:lnSpc>
+            </a:pPr>
+            <a:r>
+              <a:rPr lang="en-US" altLang="en-US" sz="2400">
+                <a:ea typeface="ＭＳ Ｐゴシック" panose="020B0600070205080204" pitchFamily="34" charset="-128"/>
+              </a:rPr>
+              <a:t>easier to use, can work with complicated “black-box” functions where computing gradients is inconvenient</a:t>
+            </a:r>
+          </a:p>
+          <a:p>
+            <a:pPr lvl="1" eaLnBrk="1" hangingPunct="1">
+              <a:lnSpc>
+                <a:spcPct val="90000"/>
+              </a:lnSpc>
+            </a:pPr>
+            <a:r>
+              <a:rPr lang="en-US" altLang="en-US" sz="2400" i="1">
+                <a:ea typeface="ＭＳ Ｐゴシック" panose="020B0600070205080204" pitchFamily="34" charset="-128"/>
+              </a:rPr>
+              <a:t>may</a:t>
+            </a:r>
+            <a:r>
+              <a:rPr lang="en-US" altLang="en-US" sz="2400">
+                <a:ea typeface="ＭＳ Ｐゴシック" panose="020B0600070205080204" pitchFamily="34" charset="-128"/>
+              </a:rPr>
+              <a:t> be only possibility for nondifferentiable problems</a:t>
+            </a:r>
+          </a:p>
+          <a:p>
+            <a:pPr lvl="1" eaLnBrk="1" hangingPunct="1">
+              <a:lnSpc>
+                <a:spcPct val="90000"/>
+              </a:lnSpc>
+            </a:pPr>
+            <a:r>
+              <a:rPr lang="en-US" altLang="en-US" sz="2400">
+                <a:ea typeface="ＭＳ Ｐゴシック" panose="020B0600070205080204" pitchFamily="34" charset="-128"/>
+              </a:rPr>
+              <a:t>need &gt; </a:t>
+            </a:r>
+            <a:r>
+              <a:rPr lang="en-US" altLang="en-US" sz="2400" i="1">
+                <a:ea typeface="ＭＳ Ｐゴシック" panose="020B0600070205080204" pitchFamily="34" charset="-128"/>
+              </a:rPr>
+              <a:t>n</a:t>
+            </a:r>
+            <a:r>
+              <a:rPr lang="en-US" altLang="en-US" sz="2400">
+                <a:ea typeface="ＭＳ Ｐゴシック" panose="020B0600070205080204" pitchFamily="34" charset="-128"/>
+              </a:rPr>
+              <a:t> function evaluations, bad for large </a:t>
+            </a:r>
+            <a:r>
+              <a:rPr lang="en-US" altLang="en-US" sz="2400" i="1">
+                <a:ea typeface="ＭＳ Ｐゴシック" panose="020B0600070205080204" pitchFamily="34" charset="-128"/>
+              </a:rPr>
+              <a:t>n</a:t>
+            </a:r>
+            <a:endParaRPr lang="en-US" altLang="en-US" sz="2400">
+              <a:ea typeface="ＭＳ Ｐゴシック" panose="020B0600070205080204" pitchFamily="34" charset="-128"/>
+            </a:endParaRPr>
+          </a:p>
+        </p:txBody>
+      </p:sp>
+    </p:spTree>
+  </p:cSld>
+  <p:clrMapOvr>
+    <a:masterClrMapping/>
+  </p:clrMapOvr>
+</p:sld>
+</file>
+
+<file path=ppt/slides/slide11.xml><?xml version="1.0" encoding="utf-8"?>
 <p:sld xmlns:a="http://schemas.openxmlformats.org/drawingml/2006/main" xmlns:r="http://schemas.openxmlformats.org/officeDocument/2006/relationships" xmlns:p="http://schemas.openxmlformats.org/presentationml/2006/main">
   <p:cSld>
     <p:spTree>
@@ -7849,7 +8235,7 @@
 </p:sld>
 </file>
 
-<file path=ppt/slides/slide11.xml><?xml version="1.0" encoding="utf-8"?>
+<file path=ppt/slides/slide12.xml><?xml version="1.0" encoding="utf-8"?>
 <p:sld xmlns:a="http://schemas.openxmlformats.org/drawingml/2006/main" xmlns:r="http://schemas.openxmlformats.org/officeDocument/2006/relationships" xmlns:p="http://schemas.openxmlformats.org/presentationml/2006/main">
   <p:cSld>
     <p:spTree>
@@ -13044,7 +13430,7 @@
 </p:sld>
 </file>
 
-<file path=ppt/slides/slide12.xml><?xml version="1.0" encoding="utf-8"?>
+<file path=ppt/slides/slide13.xml><?xml version="1.0" encoding="utf-8"?>
 <p:sld xmlns:a="http://schemas.openxmlformats.org/drawingml/2006/main" xmlns:r="http://schemas.openxmlformats.org/officeDocument/2006/relationships" xmlns:p="http://schemas.openxmlformats.org/presentationml/2006/main">
   <p:cSld>
     <p:spTree>
@@ -13569,7 +13955,7 @@
 </p:sld>
 </file>
 
-<file path=ppt/slides/slide13.xml><?xml version="1.0" encoding="utf-8"?>
+<file path=ppt/slides/slide14.xml><?xml version="1.0" encoding="utf-8"?>
 <p:sld xmlns:a="http://schemas.openxmlformats.org/drawingml/2006/main" xmlns:r="http://schemas.openxmlformats.org/officeDocument/2006/relationships" xmlns:p="http://schemas.openxmlformats.org/presentationml/2006/main">
   <p:cSld>
     <p:spTree>
@@ -16871,7 +17257,7 @@
 </p:sld>
 </file>
 
-<file path=ppt/slides/slide14.xml><?xml version="1.0" encoding="utf-8"?>
+<file path=ppt/slides/slide15.xml><?xml version="1.0" encoding="utf-8"?>
 <p:sld xmlns:a="http://schemas.openxmlformats.org/drawingml/2006/main" xmlns:r="http://schemas.openxmlformats.org/officeDocument/2006/relationships" xmlns:p="http://schemas.openxmlformats.org/presentationml/2006/main">
   <p:cSld>
     <p:spTree>
@@ -17147,8 +17533,8 @@
           </p:sp>
         </mc:Fallback>
       </mc:AlternateContent>
-      <mc:AlternateContent xmlns:mc="http://schemas.openxmlformats.org/markup-compatibility/2006">
-        <mc:Choice xmlns:a14="http://schemas.microsoft.com/office/drawing/2010/main" Requires="a14">
+      <mc:AlternateContent xmlns:mc="http://schemas.openxmlformats.org/markup-compatibility/2006" xmlns:a14="http://schemas.microsoft.com/office/drawing/2010/main">
+        <mc:Choice Requires="a14">
           <p:sp>
             <p:nvSpPr>
               <p:cNvPr id="4" name="TextBox 3">
@@ -17255,7 +17641,7 @@
             </p:txBody>
           </p:sp>
         </mc:Choice>
-        <mc:Fallback>
+        <mc:Fallback xmlns="">
           <p:sp>
             <p:nvSpPr>
               <p:cNvPr id="4" name="TextBox 3">
@@ -17300,8 +17686,8 @@
           </p:sp>
         </mc:Fallback>
       </mc:AlternateContent>
-      <mc:AlternateContent xmlns:mc="http://schemas.openxmlformats.org/markup-compatibility/2006">
-        <mc:Choice xmlns:a14="http://schemas.microsoft.com/office/drawing/2010/main" Requires="a14">
+      <mc:AlternateContent xmlns:mc="http://schemas.openxmlformats.org/markup-compatibility/2006" xmlns:a14="http://schemas.microsoft.com/office/drawing/2010/main">
+        <mc:Choice Requires="a14">
           <p:sp>
             <p:nvSpPr>
               <p:cNvPr id="5" name="TextBox 4">
@@ -17409,7 +17795,7 @@
             </p:txBody>
           </p:sp>
         </mc:Choice>
-        <mc:Fallback>
+        <mc:Fallback xmlns="">
           <p:sp>
             <p:nvSpPr>
               <p:cNvPr id="5" name="TextBox 4">
@@ -17517,8 +17903,8 @@
           </a:p>
         </p:txBody>
       </p:sp>
-      <mc:AlternateContent xmlns:mc="http://schemas.openxmlformats.org/markup-compatibility/2006">
-        <mc:Choice xmlns:a14="http://schemas.microsoft.com/office/drawing/2010/main" Requires="a14">
+      <mc:AlternateContent xmlns:mc="http://schemas.openxmlformats.org/markup-compatibility/2006" xmlns:a14="http://schemas.microsoft.com/office/drawing/2010/main">
+        <mc:Choice Requires="a14">
           <p:sp>
             <p:nvSpPr>
               <p:cNvPr id="7" name="TextBox 6">
@@ -17754,7 +18140,7 @@
             </p:txBody>
           </p:sp>
         </mc:Choice>
-        <mc:Fallback>
+        <mc:Fallback xmlns="">
           <p:sp>
             <p:nvSpPr>
               <p:cNvPr id="7" name="TextBox 6">
@@ -17812,7 +18198,7 @@
 </p:sld>
 </file>
 
-<file path=ppt/slides/slide15.xml><?xml version="1.0" encoding="utf-8"?>
+<file path=ppt/slides/slide16.xml><?xml version="1.0" encoding="utf-8"?>
 <p:sld xmlns:a="http://schemas.openxmlformats.org/drawingml/2006/main" xmlns:r="http://schemas.openxmlformats.org/officeDocument/2006/relationships" xmlns:p="http://schemas.openxmlformats.org/presentationml/2006/main">
   <p:cSld>
     <p:spTree>
@@ -19290,7 +19676,7 @@
           <a:graphicData uri="http://schemas.openxmlformats.org/presentationml/2006/ole">
             <mc:AlternateContent xmlns:mc="http://schemas.openxmlformats.org/markup-compatibility/2006">
               <mc:Choice xmlns:v="urn:schemas-microsoft-com:vml" Requires="v">
-                <p:oleObj spid="_x0000_s15391" name="Equation" r:id="rId3" imgW="8661400" imgH="1955800" progId="Equation.DSMT4">
+                <p:oleObj spid="_x0000_s15392" name="Equation" r:id="rId3" imgW="8661400" imgH="1955800" progId="Equation.DSMT4">
                   <p:embed/>
                 </p:oleObj>
               </mc:Choice>
@@ -21202,7 +21588,7 @@
           <a:graphicData uri="http://schemas.openxmlformats.org/presentationml/2006/ole">
             <mc:AlternateContent xmlns:mc="http://schemas.openxmlformats.org/markup-compatibility/2006">
               <mc:Choice xmlns:v="urn:schemas-microsoft-com:vml" Requires="v">
-                <p:oleObj spid="_x0000_s18501" name="Equation" r:id="rId3" imgW="9144000" imgH="1016000" progId="Equation.DSMT4">
+                <p:oleObj spid="_x0000_s18503" name="Equation" r:id="rId3" imgW="9144000" imgH="1016000" progId="Equation.DSMT4">
                   <p:embed/>
                 </p:oleObj>
               </mc:Choice>
@@ -21466,7 +21852,7 @@
           <a:graphicData uri="http://schemas.openxmlformats.org/presentationml/2006/ole">
             <mc:AlternateContent xmlns:mc="http://schemas.openxmlformats.org/markup-compatibility/2006">
               <mc:Choice xmlns:v="urn:schemas-microsoft-com:vml" Requires="v">
-                <p:oleObj spid="_x0000_s18502" name="Equation" r:id="rId5" imgW="8686800" imgH="5181600" progId="Equation.DSMT4">
+                <p:oleObj spid="_x0000_s18504" name="Equation" r:id="rId5" imgW="8686800" imgH="5181600" progId="Equation.DSMT4">
                   <p:embed/>
                 </p:oleObj>
               </mc:Choice>
@@ -25661,6 +26047,1319 @@
       </p:grpSpPr>
       <p:sp>
         <p:nvSpPr>
+          <p:cNvPr id="2" name="Title 1">
+            <a:extLst>
+              <a:ext uri="{FF2B5EF4-FFF2-40B4-BE49-F238E27FC236}">
+                <a16:creationId xmlns:a16="http://schemas.microsoft.com/office/drawing/2014/main" id="{7FBF642F-6D19-5C45-A826-EFC14C2CAE19}"/>
+              </a:ext>
+            </a:extLst>
+          </p:cNvPr>
+          <p:cNvSpPr>
+            <a:spLocks noGrp="1"/>
+          </p:cNvSpPr>
+          <p:nvPr>
+            <p:ph type="title"/>
+          </p:nvPr>
+        </p:nvSpPr>
+        <p:spPr>
+          <a:xfrm>
+            <a:off x="685800" y="71438"/>
+            <a:ext cx="7772400" cy="1524000"/>
+          </a:xfrm>
+        </p:spPr>
+        <p:txBody>
+          <a:bodyPr/>
+          <a:lstStyle/>
+          <a:p>
+            <a:pPr>
+              <a:defRPr/>
+            </a:pPr>
+            <a:r>
+              <a:rPr lang="en-US" dirty="0"/>
+              <a:t>Non-convex local optimization:</a:t>
+            </a:r>
+            <a:br>
+              <a:rPr lang="en-US" dirty="0"/>
+            </a:br>
+            <a:r>
+              <a:rPr lang="en-US" dirty="0"/>
+              <a:t>a typical generic outline</a:t>
+            </a:r>
+          </a:p>
+        </p:txBody>
+      </p:sp>
+      <p:sp>
+        <p:nvSpPr>
+          <p:cNvPr id="33794" name="Oval 2">
+            <a:extLst>
+              <a:ext uri="{FF2B5EF4-FFF2-40B4-BE49-F238E27FC236}">
+                <a16:creationId xmlns:a16="http://schemas.microsoft.com/office/drawing/2014/main" id="{89CB8BE3-3A31-234E-8658-6AF0EA68AF8B}"/>
+              </a:ext>
+            </a:extLst>
+          </p:cNvPr>
+          <p:cNvSpPr>
+            <a:spLocks noChangeArrowheads="1"/>
+          </p:cNvSpPr>
+          <p:nvPr/>
+        </p:nvSpPr>
+        <p:spPr bwMode="auto">
+          <a:xfrm>
+            <a:off x="685800" y="2262188"/>
+            <a:ext cx="762000" cy="762000"/>
+          </a:xfrm>
+          <a:prstGeom prst="ellipse">
+            <a:avLst/>
+          </a:prstGeom>
+          <a:solidFill>
+            <a:srgbClr val="FFFF00"/>
+          </a:solidFill>
+          <a:ln w="9525">
+            <a:solidFill>
+              <a:schemeClr val="tx1"/>
+            </a:solidFill>
+            <a:round/>
+            <a:headEnd/>
+            <a:tailEnd/>
+          </a:ln>
+        </p:spPr>
+        <p:txBody>
+          <a:bodyPr/>
+          <a:lstStyle>
+            <a:lvl1pPr>
+              <a:defRPr sz="2400">
+                <a:solidFill>
+                  <a:schemeClr val="tx1"/>
+                </a:solidFill>
+                <a:latin typeface="Times" pitchFamily="2" charset="0"/>
+                <a:ea typeface="ＭＳ Ｐゴシック" panose="020B0600070205080204" pitchFamily="34" charset="-128"/>
+              </a:defRPr>
+            </a:lvl1pPr>
+            <a:lvl2pPr marL="742950" indent="-285750">
+              <a:defRPr sz="2400">
+                <a:solidFill>
+                  <a:schemeClr val="tx1"/>
+                </a:solidFill>
+                <a:latin typeface="Times" pitchFamily="2" charset="0"/>
+                <a:ea typeface="ＭＳ Ｐゴシック" panose="020B0600070205080204" pitchFamily="34" charset="-128"/>
+              </a:defRPr>
+            </a:lvl2pPr>
+            <a:lvl3pPr marL="1143000" indent="-228600">
+              <a:defRPr sz="2400">
+                <a:solidFill>
+                  <a:schemeClr val="tx1"/>
+                </a:solidFill>
+                <a:latin typeface="Times" pitchFamily="2" charset="0"/>
+                <a:ea typeface="ＭＳ Ｐゴシック" panose="020B0600070205080204" pitchFamily="34" charset="-128"/>
+              </a:defRPr>
+            </a:lvl3pPr>
+            <a:lvl4pPr marL="1600200" indent="-228600">
+              <a:defRPr sz="2400">
+                <a:solidFill>
+                  <a:schemeClr val="tx1"/>
+                </a:solidFill>
+                <a:latin typeface="Times" pitchFamily="2" charset="0"/>
+                <a:ea typeface="ＭＳ Ｐゴシック" panose="020B0600070205080204" pitchFamily="34" charset="-128"/>
+              </a:defRPr>
+            </a:lvl4pPr>
+            <a:lvl5pPr marL="2057400" indent="-228600">
+              <a:defRPr sz="2400">
+                <a:solidFill>
+                  <a:schemeClr val="tx1"/>
+                </a:solidFill>
+                <a:latin typeface="Times" pitchFamily="2" charset="0"/>
+                <a:ea typeface="ＭＳ Ｐゴシック" panose="020B0600070205080204" pitchFamily="34" charset="-128"/>
+              </a:defRPr>
+            </a:lvl5pPr>
+            <a:lvl6pPr marL="2514600" indent="-228600" eaLnBrk="0" fontAlgn="base" hangingPunct="0">
+              <a:spcBef>
+                <a:spcPct val="0"/>
+              </a:spcBef>
+              <a:spcAft>
+                <a:spcPct val="0"/>
+              </a:spcAft>
+              <a:defRPr sz="2400">
+                <a:solidFill>
+                  <a:schemeClr val="tx1"/>
+                </a:solidFill>
+                <a:latin typeface="Times" pitchFamily="2" charset="0"/>
+                <a:ea typeface="ＭＳ Ｐゴシック" panose="020B0600070205080204" pitchFamily="34" charset="-128"/>
+              </a:defRPr>
+            </a:lvl6pPr>
+            <a:lvl7pPr marL="2971800" indent="-228600" eaLnBrk="0" fontAlgn="base" hangingPunct="0">
+              <a:spcBef>
+                <a:spcPct val="0"/>
+              </a:spcBef>
+              <a:spcAft>
+                <a:spcPct val="0"/>
+              </a:spcAft>
+              <a:defRPr sz="2400">
+                <a:solidFill>
+                  <a:schemeClr val="tx1"/>
+                </a:solidFill>
+                <a:latin typeface="Times" pitchFamily="2" charset="0"/>
+                <a:ea typeface="ＭＳ Ｐゴシック" panose="020B0600070205080204" pitchFamily="34" charset="-128"/>
+              </a:defRPr>
+            </a:lvl7pPr>
+            <a:lvl8pPr marL="3429000" indent="-228600" eaLnBrk="0" fontAlgn="base" hangingPunct="0">
+              <a:spcBef>
+                <a:spcPct val="0"/>
+              </a:spcBef>
+              <a:spcAft>
+                <a:spcPct val="0"/>
+              </a:spcAft>
+              <a:defRPr sz="2400">
+                <a:solidFill>
+                  <a:schemeClr val="tx1"/>
+                </a:solidFill>
+                <a:latin typeface="Times" pitchFamily="2" charset="0"/>
+                <a:ea typeface="ＭＳ Ｐゴシック" panose="020B0600070205080204" pitchFamily="34" charset="-128"/>
+              </a:defRPr>
+            </a:lvl8pPr>
+            <a:lvl9pPr marL="3886200" indent="-228600" eaLnBrk="0" fontAlgn="base" hangingPunct="0">
+              <a:spcBef>
+                <a:spcPct val="0"/>
+              </a:spcBef>
+              <a:spcAft>
+                <a:spcPct val="0"/>
+              </a:spcAft>
+              <a:defRPr sz="2400">
+                <a:solidFill>
+                  <a:schemeClr val="tx1"/>
+                </a:solidFill>
+                <a:latin typeface="Times" pitchFamily="2" charset="0"/>
+                <a:ea typeface="ＭＳ Ｐゴシック" panose="020B0600070205080204" pitchFamily="34" charset="-128"/>
+              </a:defRPr>
+            </a:lvl9pPr>
+          </a:lstStyle>
+          <a:p>
+            <a:pPr algn="ctr"/>
+            <a:r>
+              <a:rPr lang="en-US" altLang="en-US" sz="2800" b="1"/>
+              <a:t>1</a:t>
+            </a:r>
+          </a:p>
+        </p:txBody>
+      </p:sp>
+      <p:sp>
+        <p:nvSpPr>
+          <p:cNvPr id="33795" name="TextBox 3">
+            <a:extLst>
+              <a:ext uri="{FF2B5EF4-FFF2-40B4-BE49-F238E27FC236}">
+                <a16:creationId xmlns:a16="http://schemas.microsoft.com/office/drawing/2014/main" id="{CA5EFC81-494E-9A40-B02D-65307B064E2B}"/>
+              </a:ext>
+            </a:extLst>
+          </p:cNvPr>
+          <p:cNvSpPr txBox="1">
+            <a:spLocks noChangeArrowheads="1"/>
+          </p:cNvSpPr>
+          <p:nvPr/>
+        </p:nvSpPr>
+        <p:spPr bwMode="auto">
+          <a:xfrm>
+            <a:off x="1752600" y="2338388"/>
+            <a:ext cx="6932613" cy="954087"/>
+          </a:xfrm>
+          <a:prstGeom prst="rect">
+            <a:avLst/>
+          </a:prstGeom>
+          <a:noFill/>
+          <a:ln>
+            <a:noFill/>
+          </a:ln>
+          <a:extLst>
+            <a:ext uri="{909E8E84-426E-40DD-AFC4-6F175D3DCCD1}">
+              <a14:hiddenFill xmlns:a14="http://schemas.microsoft.com/office/drawing/2010/main">
+                <a:solidFill>
+                  <a:srgbClr val="FFFFFF"/>
+                </a:solidFill>
+              </a14:hiddenFill>
+            </a:ext>
+            <a:ext uri="{91240B29-F687-4F45-9708-019B960494DF}">
+              <a14:hiddenLine xmlns:a14="http://schemas.microsoft.com/office/drawing/2010/main" w="9525">
+                <a:solidFill>
+                  <a:srgbClr val="000000"/>
+                </a:solidFill>
+                <a:miter lim="800000"/>
+                <a:headEnd/>
+                <a:tailEnd/>
+              </a14:hiddenLine>
+            </a:ext>
+          </a:extLst>
+        </p:spPr>
+        <p:txBody>
+          <a:bodyPr wrap="none">
+            <a:spAutoFit/>
+          </a:bodyPr>
+          <a:lstStyle>
+            <a:lvl1pPr>
+              <a:defRPr sz="2400">
+                <a:solidFill>
+                  <a:schemeClr val="tx1"/>
+                </a:solidFill>
+                <a:latin typeface="Times" pitchFamily="2" charset="0"/>
+                <a:ea typeface="ＭＳ Ｐゴシック" panose="020B0600070205080204" pitchFamily="34" charset="-128"/>
+              </a:defRPr>
+            </a:lvl1pPr>
+            <a:lvl2pPr marL="742950" indent="-285750">
+              <a:defRPr sz="2400">
+                <a:solidFill>
+                  <a:schemeClr val="tx1"/>
+                </a:solidFill>
+                <a:latin typeface="Times" pitchFamily="2" charset="0"/>
+                <a:ea typeface="ＭＳ Ｐゴシック" panose="020B0600070205080204" pitchFamily="34" charset="-128"/>
+              </a:defRPr>
+            </a:lvl2pPr>
+            <a:lvl3pPr marL="1143000" indent="-228600">
+              <a:defRPr sz="2400">
+                <a:solidFill>
+                  <a:schemeClr val="tx1"/>
+                </a:solidFill>
+                <a:latin typeface="Times" pitchFamily="2" charset="0"/>
+                <a:ea typeface="ＭＳ Ｐゴシック" panose="020B0600070205080204" pitchFamily="34" charset="-128"/>
+              </a:defRPr>
+            </a:lvl3pPr>
+            <a:lvl4pPr marL="1600200" indent="-228600">
+              <a:defRPr sz="2400">
+                <a:solidFill>
+                  <a:schemeClr val="tx1"/>
+                </a:solidFill>
+                <a:latin typeface="Times" pitchFamily="2" charset="0"/>
+                <a:ea typeface="ＭＳ Ｐゴシック" panose="020B0600070205080204" pitchFamily="34" charset="-128"/>
+              </a:defRPr>
+            </a:lvl4pPr>
+            <a:lvl5pPr marL="2057400" indent="-228600">
+              <a:defRPr sz="2400">
+                <a:solidFill>
+                  <a:schemeClr val="tx1"/>
+                </a:solidFill>
+                <a:latin typeface="Times" pitchFamily="2" charset="0"/>
+                <a:ea typeface="ＭＳ Ｐゴシック" panose="020B0600070205080204" pitchFamily="34" charset="-128"/>
+              </a:defRPr>
+            </a:lvl5pPr>
+            <a:lvl6pPr marL="2514600" indent="-228600" eaLnBrk="0" fontAlgn="base" hangingPunct="0">
+              <a:spcBef>
+                <a:spcPct val="0"/>
+              </a:spcBef>
+              <a:spcAft>
+                <a:spcPct val="0"/>
+              </a:spcAft>
+              <a:defRPr sz="2400">
+                <a:solidFill>
+                  <a:schemeClr val="tx1"/>
+                </a:solidFill>
+                <a:latin typeface="Times" pitchFamily="2" charset="0"/>
+                <a:ea typeface="ＭＳ Ｐゴシック" panose="020B0600070205080204" pitchFamily="34" charset="-128"/>
+              </a:defRPr>
+            </a:lvl6pPr>
+            <a:lvl7pPr marL="2971800" indent="-228600" eaLnBrk="0" fontAlgn="base" hangingPunct="0">
+              <a:spcBef>
+                <a:spcPct val="0"/>
+              </a:spcBef>
+              <a:spcAft>
+                <a:spcPct val="0"/>
+              </a:spcAft>
+              <a:defRPr sz="2400">
+                <a:solidFill>
+                  <a:schemeClr val="tx1"/>
+                </a:solidFill>
+                <a:latin typeface="Times" pitchFamily="2" charset="0"/>
+                <a:ea typeface="ＭＳ Ｐゴシック" panose="020B0600070205080204" pitchFamily="34" charset="-128"/>
+              </a:defRPr>
+            </a:lvl7pPr>
+            <a:lvl8pPr marL="3429000" indent="-228600" eaLnBrk="0" fontAlgn="base" hangingPunct="0">
+              <a:spcBef>
+                <a:spcPct val="0"/>
+              </a:spcBef>
+              <a:spcAft>
+                <a:spcPct val="0"/>
+              </a:spcAft>
+              <a:defRPr sz="2400">
+                <a:solidFill>
+                  <a:schemeClr val="tx1"/>
+                </a:solidFill>
+                <a:latin typeface="Times" pitchFamily="2" charset="0"/>
+                <a:ea typeface="ＭＳ Ｐゴシック" panose="020B0600070205080204" pitchFamily="34" charset="-128"/>
+              </a:defRPr>
+            </a:lvl8pPr>
+            <a:lvl9pPr marL="3886200" indent="-228600" eaLnBrk="0" fontAlgn="base" hangingPunct="0">
+              <a:spcBef>
+                <a:spcPct val="0"/>
+              </a:spcBef>
+              <a:spcAft>
+                <a:spcPct val="0"/>
+              </a:spcAft>
+              <a:defRPr sz="2400">
+                <a:solidFill>
+                  <a:schemeClr val="tx1"/>
+                </a:solidFill>
+                <a:latin typeface="Times" pitchFamily="2" charset="0"/>
+                <a:ea typeface="ＭＳ Ｐゴシック" panose="020B0600070205080204" pitchFamily="34" charset="-128"/>
+              </a:defRPr>
+            </a:lvl9pPr>
+          </a:lstStyle>
+          <a:p>
+            <a:r>
+              <a:rPr lang="en-US" altLang="en-US" sz="2800"/>
+              <a:t>At current </a:t>
+            </a:r>
+            <a:r>
+              <a:rPr lang="en-US" altLang="en-US" sz="2800" b="1"/>
+              <a:t>x</a:t>
+            </a:r>
+            <a:r>
+              <a:rPr lang="en-US" altLang="en-US" sz="2800"/>
+              <a:t>, </a:t>
+            </a:r>
+            <a:r>
+              <a:rPr lang="en-US" altLang="en-US" sz="2800">
+                <a:solidFill>
+                  <a:srgbClr val="FF0000"/>
+                </a:solidFill>
+              </a:rPr>
+              <a:t>construct approximate model of </a:t>
+            </a:r>
+            <a:r>
+              <a:rPr lang="en-US" altLang="en-US" sz="2800" i="1">
+                <a:solidFill>
+                  <a:srgbClr val="FF0000"/>
+                </a:solidFill>
+              </a:rPr>
+              <a:t>f</a:t>
+            </a:r>
+            <a:r>
+              <a:rPr lang="en-US" altLang="en-US" sz="2800" i="1" baseline="-25000">
+                <a:solidFill>
+                  <a:srgbClr val="FF0000"/>
+                </a:solidFill>
+              </a:rPr>
+              <a:t>i</a:t>
+            </a:r>
+            <a:endParaRPr lang="en-US" altLang="en-US" sz="2800">
+              <a:solidFill>
+                <a:srgbClr val="FF0000"/>
+              </a:solidFill>
+            </a:endParaRPr>
+          </a:p>
+          <a:p>
+            <a:r>
+              <a:rPr lang="en-US" altLang="en-US" sz="2800"/>
+              <a:t>—e.g. affine, quadratic, … often convex</a:t>
+            </a:r>
+          </a:p>
+        </p:txBody>
+      </p:sp>
+      <p:sp>
+        <p:nvSpPr>
+          <p:cNvPr id="33796" name="Oval 4">
+            <a:extLst>
+              <a:ext uri="{FF2B5EF4-FFF2-40B4-BE49-F238E27FC236}">
+                <a16:creationId xmlns:a16="http://schemas.microsoft.com/office/drawing/2014/main" id="{C5097D07-886A-3548-93F6-7F398A6ABB37}"/>
+              </a:ext>
+            </a:extLst>
+          </p:cNvPr>
+          <p:cNvSpPr>
+            <a:spLocks noChangeArrowheads="1"/>
+          </p:cNvSpPr>
+          <p:nvPr/>
+        </p:nvSpPr>
+        <p:spPr bwMode="auto">
+          <a:xfrm>
+            <a:off x="685800" y="3670300"/>
+            <a:ext cx="762000" cy="762000"/>
+          </a:xfrm>
+          <a:prstGeom prst="ellipse">
+            <a:avLst/>
+          </a:prstGeom>
+          <a:solidFill>
+            <a:srgbClr val="FFFF00"/>
+          </a:solidFill>
+          <a:ln w="9525">
+            <a:solidFill>
+              <a:schemeClr val="tx1"/>
+            </a:solidFill>
+            <a:round/>
+            <a:headEnd/>
+            <a:tailEnd/>
+          </a:ln>
+        </p:spPr>
+        <p:txBody>
+          <a:bodyPr/>
+          <a:lstStyle>
+            <a:lvl1pPr>
+              <a:defRPr sz="2400">
+                <a:solidFill>
+                  <a:schemeClr val="tx1"/>
+                </a:solidFill>
+                <a:latin typeface="Times" pitchFamily="2" charset="0"/>
+                <a:ea typeface="ＭＳ Ｐゴシック" panose="020B0600070205080204" pitchFamily="34" charset="-128"/>
+              </a:defRPr>
+            </a:lvl1pPr>
+            <a:lvl2pPr marL="742950" indent="-285750">
+              <a:defRPr sz="2400">
+                <a:solidFill>
+                  <a:schemeClr val="tx1"/>
+                </a:solidFill>
+                <a:latin typeface="Times" pitchFamily="2" charset="0"/>
+                <a:ea typeface="ＭＳ Ｐゴシック" panose="020B0600070205080204" pitchFamily="34" charset="-128"/>
+              </a:defRPr>
+            </a:lvl2pPr>
+            <a:lvl3pPr marL="1143000" indent="-228600">
+              <a:defRPr sz="2400">
+                <a:solidFill>
+                  <a:schemeClr val="tx1"/>
+                </a:solidFill>
+                <a:latin typeface="Times" pitchFamily="2" charset="0"/>
+                <a:ea typeface="ＭＳ Ｐゴシック" panose="020B0600070205080204" pitchFamily="34" charset="-128"/>
+              </a:defRPr>
+            </a:lvl3pPr>
+            <a:lvl4pPr marL="1600200" indent="-228600">
+              <a:defRPr sz="2400">
+                <a:solidFill>
+                  <a:schemeClr val="tx1"/>
+                </a:solidFill>
+                <a:latin typeface="Times" pitchFamily="2" charset="0"/>
+                <a:ea typeface="ＭＳ Ｐゴシック" panose="020B0600070205080204" pitchFamily="34" charset="-128"/>
+              </a:defRPr>
+            </a:lvl4pPr>
+            <a:lvl5pPr marL="2057400" indent="-228600">
+              <a:defRPr sz="2400">
+                <a:solidFill>
+                  <a:schemeClr val="tx1"/>
+                </a:solidFill>
+                <a:latin typeface="Times" pitchFamily="2" charset="0"/>
+                <a:ea typeface="ＭＳ Ｐゴシック" panose="020B0600070205080204" pitchFamily="34" charset="-128"/>
+              </a:defRPr>
+            </a:lvl5pPr>
+            <a:lvl6pPr marL="2514600" indent="-228600" eaLnBrk="0" fontAlgn="base" hangingPunct="0">
+              <a:spcBef>
+                <a:spcPct val="0"/>
+              </a:spcBef>
+              <a:spcAft>
+                <a:spcPct val="0"/>
+              </a:spcAft>
+              <a:defRPr sz="2400">
+                <a:solidFill>
+                  <a:schemeClr val="tx1"/>
+                </a:solidFill>
+                <a:latin typeface="Times" pitchFamily="2" charset="0"/>
+                <a:ea typeface="ＭＳ Ｐゴシック" panose="020B0600070205080204" pitchFamily="34" charset="-128"/>
+              </a:defRPr>
+            </a:lvl6pPr>
+            <a:lvl7pPr marL="2971800" indent="-228600" eaLnBrk="0" fontAlgn="base" hangingPunct="0">
+              <a:spcBef>
+                <a:spcPct val="0"/>
+              </a:spcBef>
+              <a:spcAft>
+                <a:spcPct val="0"/>
+              </a:spcAft>
+              <a:defRPr sz="2400">
+                <a:solidFill>
+                  <a:schemeClr val="tx1"/>
+                </a:solidFill>
+                <a:latin typeface="Times" pitchFamily="2" charset="0"/>
+                <a:ea typeface="ＭＳ Ｐゴシック" panose="020B0600070205080204" pitchFamily="34" charset="-128"/>
+              </a:defRPr>
+            </a:lvl7pPr>
+            <a:lvl8pPr marL="3429000" indent="-228600" eaLnBrk="0" fontAlgn="base" hangingPunct="0">
+              <a:spcBef>
+                <a:spcPct val="0"/>
+              </a:spcBef>
+              <a:spcAft>
+                <a:spcPct val="0"/>
+              </a:spcAft>
+              <a:defRPr sz="2400">
+                <a:solidFill>
+                  <a:schemeClr val="tx1"/>
+                </a:solidFill>
+                <a:latin typeface="Times" pitchFamily="2" charset="0"/>
+                <a:ea typeface="ＭＳ Ｐゴシック" panose="020B0600070205080204" pitchFamily="34" charset="-128"/>
+              </a:defRPr>
+            </a:lvl8pPr>
+            <a:lvl9pPr marL="3886200" indent="-228600" eaLnBrk="0" fontAlgn="base" hangingPunct="0">
+              <a:spcBef>
+                <a:spcPct val="0"/>
+              </a:spcBef>
+              <a:spcAft>
+                <a:spcPct val="0"/>
+              </a:spcAft>
+              <a:defRPr sz="2400">
+                <a:solidFill>
+                  <a:schemeClr val="tx1"/>
+                </a:solidFill>
+                <a:latin typeface="Times" pitchFamily="2" charset="0"/>
+                <a:ea typeface="ＭＳ Ｐゴシック" panose="020B0600070205080204" pitchFamily="34" charset="-128"/>
+              </a:defRPr>
+            </a:lvl9pPr>
+          </a:lstStyle>
+          <a:p>
+            <a:pPr algn="ctr"/>
+            <a:r>
+              <a:rPr lang="en-US" altLang="en-US" sz="2800" b="1"/>
+              <a:t>2</a:t>
+            </a:r>
+          </a:p>
+        </p:txBody>
+      </p:sp>
+      <p:sp>
+        <p:nvSpPr>
+          <p:cNvPr id="33797" name="TextBox 5">
+            <a:extLst>
+              <a:ext uri="{FF2B5EF4-FFF2-40B4-BE49-F238E27FC236}">
+                <a16:creationId xmlns:a16="http://schemas.microsoft.com/office/drawing/2014/main" id="{76A5A706-70F0-E04F-BCF0-F47F59147F96}"/>
+              </a:ext>
+            </a:extLst>
+          </p:cNvPr>
+          <p:cNvSpPr txBox="1">
+            <a:spLocks noChangeArrowheads="1"/>
+          </p:cNvSpPr>
+          <p:nvPr/>
+        </p:nvSpPr>
+        <p:spPr bwMode="auto">
+          <a:xfrm>
+            <a:off x="1752600" y="3746500"/>
+            <a:ext cx="7191375" cy="954088"/>
+          </a:xfrm>
+          <a:prstGeom prst="rect">
+            <a:avLst/>
+          </a:prstGeom>
+          <a:noFill/>
+          <a:ln>
+            <a:noFill/>
+          </a:ln>
+          <a:extLst>
+            <a:ext uri="{909E8E84-426E-40DD-AFC4-6F175D3DCCD1}">
+              <a14:hiddenFill xmlns:a14="http://schemas.microsoft.com/office/drawing/2010/main">
+                <a:solidFill>
+                  <a:srgbClr val="FFFFFF"/>
+                </a:solidFill>
+              </a14:hiddenFill>
+            </a:ext>
+            <a:ext uri="{91240B29-F687-4F45-9708-019B960494DF}">
+              <a14:hiddenLine xmlns:a14="http://schemas.microsoft.com/office/drawing/2010/main" w="9525">
+                <a:solidFill>
+                  <a:srgbClr val="000000"/>
+                </a:solidFill>
+                <a:miter lim="800000"/>
+                <a:headEnd/>
+                <a:tailEnd/>
+              </a14:hiddenLine>
+            </a:ext>
+          </a:extLst>
+        </p:spPr>
+        <p:txBody>
+          <a:bodyPr wrap="none">
+            <a:spAutoFit/>
+          </a:bodyPr>
+          <a:lstStyle>
+            <a:lvl1pPr>
+              <a:defRPr sz="2400">
+                <a:solidFill>
+                  <a:schemeClr val="tx1"/>
+                </a:solidFill>
+                <a:latin typeface="Times" pitchFamily="2" charset="0"/>
+                <a:ea typeface="ＭＳ Ｐゴシック" panose="020B0600070205080204" pitchFamily="34" charset="-128"/>
+              </a:defRPr>
+            </a:lvl1pPr>
+            <a:lvl2pPr marL="742950" indent="-285750">
+              <a:defRPr sz="2400">
+                <a:solidFill>
+                  <a:schemeClr val="tx1"/>
+                </a:solidFill>
+                <a:latin typeface="Times" pitchFamily="2" charset="0"/>
+                <a:ea typeface="ＭＳ Ｐゴシック" panose="020B0600070205080204" pitchFamily="34" charset="-128"/>
+              </a:defRPr>
+            </a:lvl2pPr>
+            <a:lvl3pPr marL="1143000" indent="-228600">
+              <a:defRPr sz="2400">
+                <a:solidFill>
+                  <a:schemeClr val="tx1"/>
+                </a:solidFill>
+                <a:latin typeface="Times" pitchFamily="2" charset="0"/>
+                <a:ea typeface="ＭＳ Ｐゴシック" panose="020B0600070205080204" pitchFamily="34" charset="-128"/>
+              </a:defRPr>
+            </a:lvl3pPr>
+            <a:lvl4pPr marL="1600200" indent="-228600">
+              <a:defRPr sz="2400">
+                <a:solidFill>
+                  <a:schemeClr val="tx1"/>
+                </a:solidFill>
+                <a:latin typeface="Times" pitchFamily="2" charset="0"/>
+                <a:ea typeface="ＭＳ Ｐゴシック" panose="020B0600070205080204" pitchFamily="34" charset="-128"/>
+              </a:defRPr>
+            </a:lvl4pPr>
+            <a:lvl5pPr marL="2057400" indent="-228600">
+              <a:defRPr sz="2400">
+                <a:solidFill>
+                  <a:schemeClr val="tx1"/>
+                </a:solidFill>
+                <a:latin typeface="Times" pitchFamily="2" charset="0"/>
+                <a:ea typeface="ＭＳ Ｐゴシック" panose="020B0600070205080204" pitchFamily="34" charset="-128"/>
+              </a:defRPr>
+            </a:lvl5pPr>
+            <a:lvl6pPr marL="2514600" indent="-228600" eaLnBrk="0" fontAlgn="base" hangingPunct="0">
+              <a:spcBef>
+                <a:spcPct val="0"/>
+              </a:spcBef>
+              <a:spcAft>
+                <a:spcPct val="0"/>
+              </a:spcAft>
+              <a:defRPr sz="2400">
+                <a:solidFill>
+                  <a:schemeClr val="tx1"/>
+                </a:solidFill>
+                <a:latin typeface="Times" pitchFamily="2" charset="0"/>
+                <a:ea typeface="ＭＳ Ｐゴシック" panose="020B0600070205080204" pitchFamily="34" charset="-128"/>
+              </a:defRPr>
+            </a:lvl6pPr>
+            <a:lvl7pPr marL="2971800" indent="-228600" eaLnBrk="0" fontAlgn="base" hangingPunct="0">
+              <a:spcBef>
+                <a:spcPct val="0"/>
+              </a:spcBef>
+              <a:spcAft>
+                <a:spcPct val="0"/>
+              </a:spcAft>
+              <a:defRPr sz="2400">
+                <a:solidFill>
+                  <a:schemeClr val="tx1"/>
+                </a:solidFill>
+                <a:latin typeface="Times" pitchFamily="2" charset="0"/>
+                <a:ea typeface="ＭＳ Ｐゴシック" panose="020B0600070205080204" pitchFamily="34" charset="-128"/>
+              </a:defRPr>
+            </a:lvl7pPr>
+            <a:lvl8pPr marL="3429000" indent="-228600" eaLnBrk="0" fontAlgn="base" hangingPunct="0">
+              <a:spcBef>
+                <a:spcPct val="0"/>
+              </a:spcBef>
+              <a:spcAft>
+                <a:spcPct val="0"/>
+              </a:spcAft>
+              <a:defRPr sz="2400">
+                <a:solidFill>
+                  <a:schemeClr val="tx1"/>
+                </a:solidFill>
+                <a:latin typeface="Times" pitchFamily="2" charset="0"/>
+                <a:ea typeface="ＭＳ Ｐゴシック" panose="020B0600070205080204" pitchFamily="34" charset="-128"/>
+              </a:defRPr>
+            </a:lvl8pPr>
+            <a:lvl9pPr marL="3886200" indent="-228600" eaLnBrk="0" fontAlgn="base" hangingPunct="0">
+              <a:spcBef>
+                <a:spcPct val="0"/>
+              </a:spcBef>
+              <a:spcAft>
+                <a:spcPct val="0"/>
+              </a:spcAft>
+              <a:defRPr sz="2400">
+                <a:solidFill>
+                  <a:schemeClr val="tx1"/>
+                </a:solidFill>
+                <a:latin typeface="Times" pitchFamily="2" charset="0"/>
+                <a:ea typeface="ＭＳ Ｐゴシック" panose="020B0600070205080204" pitchFamily="34" charset="-128"/>
+              </a:defRPr>
+            </a:lvl9pPr>
+          </a:lstStyle>
+          <a:p>
+            <a:r>
+              <a:rPr lang="en-US" altLang="en-US" sz="2800">
+                <a:solidFill>
+                  <a:srgbClr val="FF0000"/>
+                </a:solidFill>
+              </a:rPr>
+              <a:t>Optimize the model </a:t>
+            </a:r>
+            <a:r>
+              <a:rPr lang="en-US" altLang="en-US" sz="2800"/>
+              <a:t>problem ⇒ new </a:t>
+            </a:r>
+            <a:r>
+              <a:rPr lang="en-US" altLang="en-US" sz="2800" b="1"/>
+              <a:t>x</a:t>
+            </a:r>
+            <a:endParaRPr lang="en-US" altLang="en-US" sz="2800"/>
+          </a:p>
+          <a:p>
+            <a:r>
+              <a:rPr lang="en-US" altLang="en-US" sz="2800"/>
+              <a:t>	— use a </a:t>
+            </a:r>
+            <a:r>
+              <a:rPr lang="en-US" altLang="en-US" sz="2800" i="1">
+                <a:solidFill>
+                  <a:srgbClr val="0000FF"/>
+                </a:solidFill>
+              </a:rPr>
+              <a:t>trust region</a:t>
+            </a:r>
+            <a:r>
+              <a:rPr lang="en-US" altLang="en-US" sz="2800">
+                <a:solidFill>
+                  <a:srgbClr val="0000FF"/>
+                </a:solidFill>
+              </a:rPr>
+              <a:t> </a:t>
+            </a:r>
+            <a:r>
+              <a:rPr lang="en-US" altLang="en-US" sz="2800"/>
+              <a:t>to prevent large steps</a:t>
+            </a:r>
+          </a:p>
+        </p:txBody>
+      </p:sp>
+      <p:sp>
+        <p:nvSpPr>
+          <p:cNvPr id="33798" name="Oval 6">
+            <a:extLst>
+              <a:ext uri="{FF2B5EF4-FFF2-40B4-BE49-F238E27FC236}">
+                <a16:creationId xmlns:a16="http://schemas.microsoft.com/office/drawing/2014/main" id="{620CEB28-9366-DF47-B816-562C0A8E57D4}"/>
+              </a:ext>
+            </a:extLst>
+          </p:cNvPr>
+          <p:cNvSpPr>
+            <a:spLocks noChangeArrowheads="1"/>
+          </p:cNvSpPr>
+          <p:nvPr/>
+        </p:nvSpPr>
+        <p:spPr bwMode="auto">
+          <a:xfrm>
+            <a:off x="685800" y="4813300"/>
+            <a:ext cx="762000" cy="762000"/>
+          </a:xfrm>
+          <a:prstGeom prst="ellipse">
+            <a:avLst/>
+          </a:prstGeom>
+          <a:solidFill>
+            <a:srgbClr val="FFFF00"/>
+          </a:solidFill>
+          <a:ln w="9525">
+            <a:solidFill>
+              <a:schemeClr val="tx1"/>
+            </a:solidFill>
+            <a:round/>
+            <a:headEnd/>
+            <a:tailEnd/>
+          </a:ln>
+        </p:spPr>
+        <p:txBody>
+          <a:bodyPr/>
+          <a:lstStyle>
+            <a:lvl1pPr>
+              <a:defRPr sz="2400">
+                <a:solidFill>
+                  <a:schemeClr val="tx1"/>
+                </a:solidFill>
+                <a:latin typeface="Times" pitchFamily="2" charset="0"/>
+                <a:ea typeface="ＭＳ Ｐゴシック" panose="020B0600070205080204" pitchFamily="34" charset="-128"/>
+              </a:defRPr>
+            </a:lvl1pPr>
+            <a:lvl2pPr marL="742950" indent="-285750">
+              <a:defRPr sz="2400">
+                <a:solidFill>
+                  <a:schemeClr val="tx1"/>
+                </a:solidFill>
+                <a:latin typeface="Times" pitchFamily="2" charset="0"/>
+                <a:ea typeface="ＭＳ Ｐゴシック" panose="020B0600070205080204" pitchFamily="34" charset="-128"/>
+              </a:defRPr>
+            </a:lvl2pPr>
+            <a:lvl3pPr marL="1143000" indent="-228600">
+              <a:defRPr sz="2400">
+                <a:solidFill>
+                  <a:schemeClr val="tx1"/>
+                </a:solidFill>
+                <a:latin typeface="Times" pitchFamily="2" charset="0"/>
+                <a:ea typeface="ＭＳ Ｐゴシック" panose="020B0600070205080204" pitchFamily="34" charset="-128"/>
+              </a:defRPr>
+            </a:lvl3pPr>
+            <a:lvl4pPr marL="1600200" indent="-228600">
+              <a:defRPr sz="2400">
+                <a:solidFill>
+                  <a:schemeClr val="tx1"/>
+                </a:solidFill>
+                <a:latin typeface="Times" pitchFamily="2" charset="0"/>
+                <a:ea typeface="ＭＳ Ｐゴシック" panose="020B0600070205080204" pitchFamily="34" charset="-128"/>
+              </a:defRPr>
+            </a:lvl4pPr>
+            <a:lvl5pPr marL="2057400" indent="-228600">
+              <a:defRPr sz="2400">
+                <a:solidFill>
+                  <a:schemeClr val="tx1"/>
+                </a:solidFill>
+                <a:latin typeface="Times" pitchFamily="2" charset="0"/>
+                <a:ea typeface="ＭＳ Ｐゴシック" panose="020B0600070205080204" pitchFamily="34" charset="-128"/>
+              </a:defRPr>
+            </a:lvl5pPr>
+            <a:lvl6pPr marL="2514600" indent="-228600" eaLnBrk="0" fontAlgn="base" hangingPunct="0">
+              <a:spcBef>
+                <a:spcPct val="0"/>
+              </a:spcBef>
+              <a:spcAft>
+                <a:spcPct val="0"/>
+              </a:spcAft>
+              <a:defRPr sz="2400">
+                <a:solidFill>
+                  <a:schemeClr val="tx1"/>
+                </a:solidFill>
+                <a:latin typeface="Times" pitchFamily="2" charset="0"/>
+                <a:ea typeface="ＭＳ Ｐゴシック" panose="020B0600070205080204" pitchFamily="34" charset="-128"/>
+              </a:defRPr>
+            </a:lvl6pPr>
+            <a:lvl7pPr marL="2971800" indent="-228600" eaLnBrk="0" fontAlgn="base" hangingPunct="0">
+              <a:spcBef>
+                <a:spcPct val="0"/>
+              </a:spcBef>
+              <a:spcAft>
+                <a:spcPct val="0"/>
+              </a:spcAft>
+              <a:defRPr sz="2400">
+                <a:solidFill>
+                  <a:schemeClr val="tx1"/>
+                </a:solidFill>
+                <a:latin typeface="Times" pitchFamily="2" charset="0"/>
+                <a:ea typeface="ＭＳ Ｐゴシック" panose="020B0600070205080204" pitchFamily="34" charset="-128"/>
+              </a:defRPr>
+            </a:lvl7pPr>
+            <a:lvl8pPr marL="3429000" indent="-228600" eaLnBrk="0" fontAlgn="base" hangingPunct="0">
+              <a:spcBef>
+                <a:spcPct val="0"/>
+              </a:spcBef>
+              <a:spcAft>
+                <a:spcPct val="0"/>
+              </a:spcAft>
+              <a:defRPr sz="2400">
+                <a:solidFill>
+                  <a:schemeClr val="tx1"/>
+                </a:solidFill>
+                <a:latin typeface="Times" pitchFamily="2" charset="0"/>
+                <a:ea typeface="ＭＳ Ｐゴシック" panose="020B0600070205080204" pitchFamily="34" charset="-128"/>
+              </a:defRPr>
+            </a:lvl8pPr>
+            <a:lvl9pPr marL="3886200" indent="-228600" eaLnBrk="0" fontAlgn="base" hangingPunct="0">
+              <a:spcBef>
+                <a:spcPct val="0"/>
+              </a:spcBef>
+              <a:spcAft>
+                <a:spcPct val="0"/>
+              </a:spcAft>
+              <a:defRPr sz="2400">
+                <a:solidFill>
+                  <a:schemeClr val="tx1"/>
+                </a:solidFill>
+                <a:latin typeface="Times" pitchFamily="2" charset="0"/>
+                <a:ea typeface="ＭＳ Ｐゴシック" panose="020B0600070205080204" pitchFamily="34" charset="-128"/>
+              </a:defRPr>
+            </a:lvl9pPr>
+          </a:lstStyle>
+          <a:p>
+            <a:pPr algn="ctr"/>
+            <a:r>
+              <a:rPr lang="en-US" altLang="en-US" sz="2800" b="1"/>
+              <a:t>3</a:t>
+            </a:r>
+          </a:p>
+        </p:txBody>
+      </p:sp>
+      <p:sp>
+        <p:nvSpPr>
+          <p:cNvPr id="33799" name="TextBox 7">
+            <a:extLst>
+              <a:ext uri="{FF2B5EF4-FFF2-40B4-BE49-F238E27FC236}">
+                <a16:creationId xmlns:a16="http://schemas.microsoft.com/office/drawing/2014/main" id="{0B99FE8E-B1B4-EE46-9858-A31E9F2E31F3}"/>
+              </a:ext>
+            </a:extLst>
+          </p:cNvPr>
+          <p:cNvSpPr txBox="1">
+            <a:spLocks noChangeArrowheads="1"/>
+          </p:cNvSpPr>
+          <p:nvPr/>
+        </p:nvSpPr>
+        <p:spPr bwMode="auto">
+          <a:xfrm>
+            <a:off x="1752600" y="4889500"/>
+            <a:ext cx="6702425" cy="1816100"/>
+          </a:xfrm>
+          <a:prstGeom prst="rect">
+            <a:avLst/>
+          </a:prstGeom>
+          <a:noFill/>
+          <a:ln>
+            <a:noFill/>
+          </a:ln>
+          <a:extLst>
+            <a:ext uri="{909E8E84-426E-40DD-AFC4-6F175D3DCCD1}">
+              <a14:hiddenFill xmlns:a14="http://schemas.microsoft.com/office/drawing/2010/main">
+                <a:solidFill>
+                  <a:srgbClr val="FFFFFF"/>
+                </a:solidFill>
+              </a14:hiddenFill>
+            </a:ext>
+            <a:ext uri="{91240B29-F687-4F45-9708-019B960494DF}">
+              <a14:hiddenLine xmlns:a14="http://schemas.microsoft.com/office/drawing/2010/main" w="9525">
+                <a:solidFill>
+                  <a:srgbClr val="000000"/>
+                </a:solidFill>
+                <a:miter lim="800000"/>
+                <a:headEnd/>
+                <a:tailEnd/>
+              </a14:hiddenLine>
+            </a:ext>
+          </a:extLst>
+        </p:spPr>
+        <p:txBody>
+          <a:bodyPr wrap="none">
+            <a:spAutoFit/>
+          </a:bodyPr>
+          <a:lstStyle>
+            <a:lvl1pPr>
+              <a:defRPr sz="2400">
+                <a:solidFill>
+                  <a:schemeClr val="tx1"/>
+                </a:solidFill>
+                <a:latin typeface="Times" pitchFamily="2" charset="0"/>
+                <a:ea typeface="ＭＳ Ｐゴシック" panose="020B0600070205080204" pitchFamily="34" charset="-128"/>
+              </a:defRPr>
+            </a:lvl1pPr>
+            <a:lvl2pPr marL="742950" indent="-285750">
+              <a:defRPr sz="2400">
+                <a:solidFill>
+                  <a:schemeClr val="tx1"/>
+                </a:solidFill>
+                <a:latin typeface="Times" pitchFamily="2" charset="0"/>
+                <a:ea typeface="ＭＳ Ｐゴシック" panose="020B0600070205080204" pitchFamily="34" charset="-128"/>
+              </a:defRPr>
+            </a:lvl2pPr>
+            <a:lvl3pPr marL="1143000" indent="-228600">
+              <a:defRPr sz="2400">
+                <a:solidFill>
+                  <a:schemeClr val="tx1"/>
+                </a:solidFill>
+                <a:latin typeface="Times" pitchFamily="2" charset="0"/>
+                <a:ea typeface="ＭＳ Ｐゴシック" panose="020B0600070205080204" pitchFamily="34" charset="-128"/>
+              </a:defRPr>
+            </a:lvl3pPr>
+            <a:lvl4pPr marL="1600200" indent="-228600">
+              <a:defRPr sz="2400">
+                <a:solidFill>
+                  <a:schemeClr val="tx1"/>
+                </a:solidFill>
+                <a:latin typeface="Times" pitchFamily="2" charset="0"/>
+                <a:ea typeface="ＭＳ Ｐゴシック" panose="020B0600070205080204" pitchFamily="34" charset="-128"/>
+              </a:defRPr>
+            </a:lvl4pPr>
+            <a:lvl5pPr marL="2057400" indent="-228600">
+              <a:defRPr sz="2400">
+                <a:solidFill>
+                  <a:schemeClr val="tx1"/>
+                </a:solidFill>
+                <a:latin typeface="Times" pitchFamily="2" charset="0"/>
+                <a:ea typeface="ＭＳ Ｐゴシック" panose="020B0600070205080204" pitchFamily="34" charset="-128"/>
+              </a:defRPr>
+            </a:lvl5pPr>
+            <a:lvl6pPr marL="2514600" indent="-228600" eaLnBrk="0" fontAlgn="base" hangingPunct="0">
+              <a:spcBef>
+                <a:spcPct val="0"/>
+              </a:spcBef>
+              <a:spcAft>
+                <a:spcPct val="0"/>
+              </a:spcAft>
+              <a:defRPr sz="2400">
+                <a:solidFill>
+                  <a:schemeClr val="tx1"/>
+                </a:solidFill>
+                <a:latin typeface="Times" pitchFamily="2" charset="0"/>
+                <a:ea typeface="ＭＳ Ｐゴシック" panose="020B0600070205080204" pitchFamily="34" charset="-128"/>
+              </a:defRPr>
+            </a:lvl6pPr>
+            <a:lvl7pPr marL="2971800" indent="-228600" eaLnBrk="0" fontAlgn="base" hangingPunct="0">
+              <a:spcBef>
+                <a:spcPct val="0"/>
+              </a:spcBef>
+              <a:spcAft>
+                <a:spcPct val="0"/>
+              </a:spcAft>
+              <a:defRPr sz="2400">
+                <a:solidFill>
+                  <a:schemeClr val="tx1"/>
+                </a:solidFill>
+                <a:latin typeface="Times" pitchFamily="2" charset="0"/>
+                <a:ea typeface="ＭＳ Ｐゴシック" panose="020B0600070205080204" pitchFamily="34" charset="-128"/>
+              </a:defRPr>
+            </a:lvl7pPr>
+            <a:lvl8pPr marL="3429000" indent="-228600" eaLnBrk="0" fontAlgn="base" hangingPunct="0">
+              <a:spcBef>
+                <a:spcPct val="0"/>
+              </a:spcBef>
+              <a:spcAft>
+                <a:spcPct val="0"/>
+              </a:spcAft>
+              <a:defRPr sz="2400">
+                <a:solidFill>
+                  <a:schemeClr val="tx1"/>
+                </a:solidFill>
+                <a:latin typeface="Times" pitchFamily="2" charset="0"/>
+                <a:ea typeface="ＭＳ Ｐゴシック" panose="020B0600070205080204" pitchFamily="34" charset="-128"/>
+              </a:defRPr>
+            </a:lvl8pPr>
+            <a:lvl9pPr marL="3886200" indent="-228600" eaLnBrk="0" fontAlgn="base" hangingPunct="0">
+              <a:spcBef>
+                <a:spcPct val="0"/>
+              </a:spcBef>
+              <a:spcAft>
+                <a:spcPct val="0"/>
+              </a:spcAft>
+              <a:defRPr sz="2400">
+                <a:solidFill>
+                  <a:schemeClr val="tx1"/>
+                </a:solidFill>
+                <a:latin typeface="Times" pitchFamily="2" charset="0"/>
+                <a:ea typeface="ＭＳ Ｐゴシック" panose="020B0600070205080204" pitchFamily="34" charset="-128"/>
+              </a:defRPr>
+            </a:lvl9pPr>
+          </a:lstStyle>
+          <a:p>
+            <a:r>
+              <a:rPr lang="en-US" altLang="en-US" sz="2800"/>
+              <a:t>Evaluate new </a:t>
+            </a:r>
+            <a:r>
+              <a:rPr lang="en-US" altLang="en-US" sz="2800" b="1"/>
+              <a:t>x</a:t>
+            </a:r>
+            <a:r>
+              <a:rPr lang="en-US" altLang="en-US" sz="2800"/>
+              <a:t>:</a:t>
+            </a:r>
+          </a:p>
+          <a:p>
+            <a:r>
+              <a:rPr lang="en-US" altLang="en-US" sz="2800"/>
+              <a:t>	— if “acceptable,” go to </a:t>
+            </a:r>
+            <a:r>
+              <a:rPr lang="en-US" altLang="en-US" sz="2800" b="1"/>
+              <a:t>1</a:t>
+            </a:r>
+          </a:p>
+          <a:p>
+            <a:r>
+              <a:rPr lang="en-US" altLang="en-US" sz="2800" b="1"/>
+              <a:t>	</a:t>
+            </a:r>
+            <a:r>
+              <a:rPr lang="en-US" altLang="en-US" sz="2800"/>
+              <a:t>— if bad step (or bad model), update</a:t>
+            </a:r>
+          </a:p>
+          <a:p>
+            <a:r>
+              <a:rPr lang="en-US" altLang="en-US" sz="2800" b="1"/>
+              <a:t>		</a:t>
+            </a:r>
+            <a:r>
+              <a:rPr lang="en-US" altLang="en-US" sz="2800"/>
+              <a:t>trust region / model and go to </a:t>
+            </a:r>
+            <a:r>
+              <a:rPr lang="en-US" altLang="en-US" sz="2800" b="1"/>
+              <a:t>2</a:t>
+            </a:r>
+          </a:p>
+        </p:txBody>
+      </p:sp>
+      <p:sp>
+        <p:nvSpPr>
+          <p:cNvPr id="33800" name="TextBox 8">
+            <a:extLst>
+              <a:ext uri="{FF2B5EF4-FFF2-40B4-BE49-F238E27FC236}">
+                <a16:creationId xmlns:a16="http://schemas.microsoft.com/office/drawing/2014/main" id="{51A4C80E-8329-6848-B722-DC14666B763C}"/>
+              </a:ext>
+            </a:extLst>
+          </p:cNvPr>
+          <p:cNvSpPr txBox="1">
+            <a:spLocks noChangeArrowheads="1"/>
+          </p:cNvSpPr>
+          <p:nvPr/>
+        </p:nvSpPr>
+        <p:spPr bwMode="auto">
+          <a:xfrm>
+            <a:off x="2209800" y="1600200"/>
+            <a:ext cx="4916488" cy="461963"/>
+          </a:xfrm>
+          <a:prstGeom prst="rect">
+            <a:avLst/>
+          </a:prstGeom>
+          <a:noFill/>
+          <a:ln>
+            <a:noFill/>
+          </a:ln>
+          <a:extLst>
+            <a:ext uri="{909E8E84-426E-40DD-AFC4-6F175D3DCCD1}">
+              <a14:hiddenFill xmlns:a14="http://schemas.microsoft.com/office/drawing/2010/main">
+                <a:solidFill>
+                  <a:srgbClr val="FFFFFF"/>
+                </a:solidFill>
+              </a14:hiddenFill>
+            </a:ext>
+            <a:ext uri="{91240B29-F687-4F45-9708-019B960494DF}">
+              <a14:hiddenLine xmlns:a14="http://schemas.microsoft.com/office/drawing/2010/main" w="9525">
+                <a:solidFill>
+                  <a:srgbClr val="000000"/>
+                </a:solidFill>
+                <a:miter lim="800000"/>
+                <a:headEnd/>
+                <a:tailEnd/>
+              </a14:hiddenLine>
+            </a:ext>
+          </a:extLst>
+        </p:spPr>
+        <p:txBody>
+          <a:bodyPr wrap="none">
+            <a:spAutoFit/>
+          </a:bodyPr>
+          <a:lstStyle>
+            <a:lvl1pPr>
+              <a:defRPr sz="2400">
+                <a:solidFill>
+                  <a:schemeClr val="tx1"/>
+                </a:solidFill>
+                <a:latin typeface="Times" pitchFamily="2" charset="0"/>
+                <a:ea typeface="ＭＳ Ｐゴシック" panose="020B0600070205080204" pitchFamily="34" charset="-128"/>
+              </a:defRPr>
+            </a:lvl1pPr>
+            <a:lvl2pPr marL="742950" indent="-285750">
+              <a:defRPr sz="2400">
+                <a:solidFill>
+                  <a:schemeClr val="tx1"/>
+                </a:solidFill>
+                <a:latin typeface="Times" pitchFamily="2" charset="0"/>
+                <a:ea typeface="ＭＳ Ｐゴシック" panose="020B0600070205080204" pitchFamily="34" charset="-128"/>
+              </a:defRPr>
+            </a:lvl2pPr>
+            <a:lvl3pPr marL="1143000" indent="-228600">
+              <a:defRPr sz="2400">
+                <a:solidFill>
+                  <a:schemeClr val="tx1"/>
+                </a:solidFill>
+                <a:latin typeface="Times" pitchFamily="2" charset="0"/>
+                <a:ea typeface="ＭＳ Ｐゴシック" panose="020B0600070205080204" pitchFamily="34" charset="-128"/>
+              </a:defRPr>
+            </a:lvl3pPr>
+            <a:lvl4pPr marL="1600200" indent="-228600">
+              <a:defRPr sz="2400">
+                <a:solidFill>
+                  <a:schemeClr val="tx1"/>
+                </a:solidFill>
+                <a:latin typeface="Times" pitchFamily="2" charset="0"/>
+                <a:ea typeface="ＭＳ Ｐゴシック" panose="020B0600070205080204" pitchFamily="34" charset="-128"/>
+              </a:defRPr>
+            </a:lvl4pPr>
+            <a:lvl5pPr marL="2057400" indent="-228600">
+              <a:defRPr sz="2400">
+                <a:solidFill>
+                  <a:schemeClr val="tx1"/>
+                </a:solidFill>
+                <a:latin typeface="Times" pitchFamily="2" charset="0"/>
+                <a:ea typeface="ＭＳ Ｐゴシック" panose="020B0600070205080204" pitchFamily="34" charset="-128"/>
+              </a:defRPr>
+            </a:lvl5pPr>
+            <a:lvl6pPr marL="2514600" indent="-228600" eaLnBrk="0" fontAlgn="base" hangingPunct="0">
+              <a:spcBef>
+                <a:spcPct val="0"/>
+              </a:spcBef>
+              <a:spcAft>
+                <a:spcPct val="0"/>
+              </a:spcAft>
+              <a:defRPr sz="2400">
+                <a:solidFill>
+                  <a:schemeClr val="tx1"/>
+                </a:solidFill>
+                <a:latin typeface="Times" pitchFamily="2" charset="0"/>
+                <a:ea typeface="ＭＳ Ｐゴシック" panose="020B0600070205080204" pitchFamily="34" charset="-128"/>
+              </a:defRPr>
+            </a:lvl6pPr>
+            <a:lvl7pPr marL="2971800" indent="-228600" eaLnBrk="0" fontAlgn="base" hangingPunct="0">
+              <a:spcBef>
+                <a:spcPct val="0"/>
+              </a:spcBef>
+              <a:spcAft>
+                <a:spcPct val="0"/>
+              </a:spcAft>
+              <a:defRPr sz="2400">
+                <a:solidFill>
+                  <a:schemeClr val="tx1"/>
+                </a:solidFill>
+                <a:latin typeface="Times" pitchFamily="2" charset="0"/>
+                <a:ea typeface="ＭＳ Ｐゴシック" panose="020B0600070205080204" pitchFamily="34" charset="-128"/>
+              </a:defRPr>
+            </a:lvl7pPr>
+            <a:lvl8pPr marL="3429000" indent="-228600" eaLnBrk="0" fontAlgn="base" hangingPunct="0">
+              <a:spcBef>
+                <a:spcPct val="0"/>
+              </a:spcBef>
+              <a:spcAft>
+                <a:spcPct val="0"/>
+              </a:spcAft>
+              <a:defRPr sz="2400">
+                <a:solidFill>
+                  <a:schemeClr val="tx1"/>
+                </a:solidFill>
+                <a:latin typeface="Times" pitchFamily="2" charset="0"/>
+                <a:ea typeface="ＭＳ Ｐゴシック" panose="020B0600070205080204" pitchFamily="34" charset="-128"/>
+              </a:defRPr>
+            </a:lvl8pPr>
+            <a:lvl9pPr marL="3886200" indent="-228600" eaLnBrk="0" fontAlgn="base" hangingPunct="0">
+              <a:spcBef>
+                <a:spcPct val="0"/>
+              </a:spcBef>
+              <a:spcAft>
+                <a:spcPct val="0"/>
+              </a:spcAft>
+              <a:defRPr sz="2400">
+                <a:solidFill>
+                  <a:schemeClr val="tx1"/>
+                </a:solidFill>
+                <a:latin typeface="Times" pitchFamily="2" charset="0"/>
+                <a:ea typeface="ＭＳ Ｐゴシック" panose="020B0600070205080204" pitchFamily="34" charset="-128"/>
+              </a:defRPr>
+            </a:lvl9pPr>
+          </a:lstStyle>
+          <a:p>
+            <a:r>
+              <a:rPr lang="en-US" altLang="en-US"/>
+              <a:t>[ many, many variations in details !!! ]</a:t>
+            </a:r>
+          </a:p>
+        </p:txBody>
+      </p:sp>
+    </p:spTree>
+    <p:extLst>
+      <p:ext uri="{BB962C8B-B14F-4D97-AF65-F5344CB8AC3E}">
+        <p14:creationId xmlns:p14="http://schemas.microsoft.com/office/powerpoint/2010/main" val="659710735"/>
+      </p:ext>
+    </p:extLst>
+  </p:cSld>
+  <p:clrMapOvr>
+    <a:masterClrMapping/>
+  </p:clrMapOvr>
+</p:sld>
+</file>
+
+<file path=ppt/slides/slide9.xml><?xml version="1.0" encoding="utf-8"?>
+<p:sld xmlns:a="http://schemas.openxmlformats.org/drawingml/2006/main" xmlns:r="http://schemas.openxmlformats.org/officeDocument/2006/relationships" xmlns:p="http://schemas.openxmlformats.org/presentationml/2006/main">
+  <p:cSld>
+    <p:spTree>
+      <p:nvGrpSpPr>
+        <p:cNvPr id="1" name=""/>
+        <p:cNvGrpSpPr/>
+        <p:nvPr/>
+      </p:nvGrpSpPr>
+      <p:grpSpPr>
+        <a:xfrm>
+          <a:off x="0" y="0"/>
+          <a:ext cx="0" cy="0"/>
+          <a:chOff x="0" y="0"/>
+          <a:chExt cx="0" cy="0"/>
+        </a:xfrm>
+      </p:grpSpPr>
+      <p:sp>
+        <p:nvSpPr>
           <p:cNvPr id="20482" name="Rectangle 2">
             <a:extLst>
               <a:ext uri="{FF2B5EF4-FFF2-40B4-BE49-F238E27FC236}">
@@ -26034,391 +27733,6 @@
               </a:rPr>
               <a:t>A</a:t>
             </a:r>
-          </a:p>
-        </p:txBody>
-      </p:sp>
-    </p:spTree>
-  </p:cSld>
-  <p:clrMapOvr>
-    <a:masterClrMapping/>
-  </p:clrMapOvr>
-</p:sld>
-</file>
-
-<file path=ppt/slides/slide9.xml><?xml version="1.0" encoding="utf-8"?>
-<p:sld xmlns:a="http://schemas.openxmlformats.org/drawingml/2006/main" xmlns:r="http://schemas.openxmlformats.org/officeDocument/2006/relationships" xmlns:p="http://schemas.openxmlformats.org/presentationml/2006/main">
-  <p:cSld>
-    <p:spTree>
-      <p:nvGrpSpPr>
-        <p:cNvPr id="1" name=""/>
-        <p:cNvGrpSpPr/>
-        <p:nvPr/>
-      </p:nvGrpSpPr>
-      <p:grpSpPr>
-        <a:xfrm>
-          <a:off x="0" y="0"/>
-          <a:ext cx="0" cy="0"/>
-          <a:chOff x="0" y="0"/>
-          <a:chExt cx="0" cy="0"/>
-        </a:xfrm>
-      </p:grpSpPr>
-      <p:sp>
-        <p:nvSpPr>
-          <p:cNvPr id="21506" name="Rectangle 2">
-            <a:extLst>
-              <a:ext uri="{FF2B5EF4-FFF2-40B4-BE49-F238E27FC236}">
-                <a16:creationId xmlns:a16="http://schemas.microsoft.com/office/drawing/2014/main" id="{3C3E5631-988C-C645-A139-EF0B71FBA641}"/>
-              </a:ext>
-            </a:extLst>
-          </p:cNvPr>
-          <p:cNvSpPr>
-            <a:spLocks noGrp="1" noChangeArrowheads="1"/>
-          </p:cNvSpPr>
-          <p:nvPr>
-            <p:ph type="title"/>
-          </p:nvPr>
-        </p:nvSpPr>
-        <p:spPr>
-          <a:xfrm>
-            <a:off x="685800" y="76200"/>
-            <a:ext cx="7772400" cy="1143000"/>
-          </a:xfrm>
-        </p:spPr>
-        <p:txBody>
-          <a:bodyPr/>
-          <a:lstStyle/>
-          <a:p>
-            <a:pPr eaLnBrk="1" hangingPunct="1"/>
-            <a:r>
-              <a:rPr lang="en-US" altLang="en-US"/>
-              <a:t>Derivatives of </a:t>
-            </a:r>
-            <a:r>
-              <a:rPr lang="en-US" altLang="en-US" i="1"/>
-              <a:t>f</a:t>
-            </a:r>
-            <a:r>
-              <a:rPr lang="en-US" altLang="en-US" i="1" baseline="-25000"/>
-              <a:t>i</a:t>
-            </a:r>
-            <a:endParaRPr lang="en-US" altLang="en-US"/>
-          </a:p>
-        </p:txBody>
-      </p:sp>
-      <p:sp>
-        <p:nvSpPr>
-          <p:cNvPr id="21507" name="Rectangle 3">
-            <a:extLst>
-              <a:ext uri="{FF2B5EF4-FFF2-40B4-BE49-F238E27FC236}">
-                <a16:creationId xmlns:a16="http://schemas.microsoft.com/office/drawing/2014/main" id="{B6F88915-BEC4-FF4E-A4FC-7A2597ECFA36}"/>
-              </a:ext>
-            </a:extLst>
-          </p:cNvPr>
-          <p:cNvSpPr>
-            <a:spLocks noGrp="1" noChangeArrowheads="1"/>
-          </p:cNvSpPr>
-          <p:nvPr>
-            <p:ph type="body" idx="1"/>
-          </p:nvPr>
-        </p:nvSpPr>
-        <p:spPr>
-          <a:xfrm>
-            <a:off x="685800" y="1143000"/>
-            <a:ext cx="7772400" cy="4114800"/>
-          </a:xfrm>
-        </p:spPr>
-        <p:txBody>
-          <a:bodyPr/>
-          <a:lstStyle/>
-          <a:p>
-            <a:pPr eaLnBrk="1" hangingPunct="1">
-              <a:lnSpc>
-                <a:spcPct val="90000"/>
-              </a:lnSpc>
-            </a:pPr>
-            <a:r>
-              <a:rPr lang="en-US" altLang="en-US" sz="2800"/>
-              <a:t>Most-efficient algorithms typically </a:t>
-            </a:r>
-            <a:r>
-              <a:rPr lang="en-US" altLang="en-US" sz="2800">
-                <a:solidFill>
-                  <a:schemeClr val="accent2"/>
-                </a:solidFill>
-              </a:rPr>
-              <a:t>require user to supply the gradients </a:t>
-            </a:r>
-            <a:r>
-              <a:rPr lang="en-US" altLang="en-US" sz="2800">
-                <a:solidFill>
-                  <a:schemeClr val="accent2"/>
-                </a:solidFill>
-                <a:sym typeface="Symbol" pitchFamily="2" charset="2"/>
-              </a:rPr>
-              <a:t></a:t>
-            </a:r>
-            <a:r>
-              <a:rPr lang="en-US" altLang="en-US" sz="2800" i="1" baseline="-25000">
-                <a:solidFill>
-                  <a:schemeClr val="accent2"/>
-                </a:solidFill>
-                <a:sym typeface="Symbol" pitchFamily="2" charset="2"/>
-              </a:rPr>
-              <a:t>x</a:t>
-            </a:r>
-            <a:r>
-              <a:rPr lang="en-US" altLang="en-US" sz="2800" i="1">
-                <a:solidFill>
-                  <a:schemeClr val="accent2"/>
-                </a:solidFill>
-                <a:sym typeface="Symbol" pitchFamily="2" charset="2"/>
-              </a:rPr>
-              <a:t>f</a:t>
-            </a:r>
-            <a:r>
-              <a:rPr lang="en-US" altLang="en-US" sz="2800" i="1" baseline="-25000">
-                <a:solidFill>
-                  <a:schemeClr val="accent2"/>
-                </a:solidFill>
-                <a:sym typeface="Symbol" pitchFamily="2" charset="2"/>
-              </a:rPr>
-              <a:t>i</a:t>
-            </a:r>
-            <a:r>
-              <a:rPr lang="en-US" altLang="en-US" sz="2800" i="1" baseline="-25000">
-                <a:sym typeface="Symbol" pitchFamily="2" charset="2"/>
-              </a:rPr>
-              <a:t> </a:t>
-            </a:r>
-            <a:r>
-              <a:rPr lang="en-US" altLang="en-US" sz="2800"/>
-              <a:t> of objective/constraints </a:t>
-            </a:r>
-          </a:p>
-          <a:p>
-            <a:pPr lvl="1" eaLnBrk="1" hangingPunct="1">
-              <a:lnSpc>
-                <a:spcPct val="90000"/>
-              </a:lnSpc>
-            </a:pPr>
-            <a:r>
-              <a:rPr lang="en-US" altLang="en-US" sz="2400">
-                <a:ea typeface="ＭＳ Ｐゴシック" panose="020B0600070205080204" pitchFamily="34" charset="-128"/>
-              </a:rPr>
-              <a:t>you should </a:t>
-            </a:r>
-            <a:r>
-              <a:rPr lang="en-US" altLang="en-US" sz="2400" i="1">
-                <a:ea typeface="ＭＳ Ｐゴシック" panose="020B0600070205080204" pitchFamily="34" charset="-128"/>
-              </a:rPr>
-              <a:t>always</a:t>
-            </a:r>
-            <a:r>
-              <a:rPr lang="en-US" altLang="en-US" sz="2400">
-                <a:ea typeface="ＭＳ Ｐゴシック" panose="020B0600070205080204" pitchFamily="34" charset="-128"/>
-              </a:rPr>
-              <a:t> compute these analytically</a:t>
-            </a:r>
-          </a:p>
-          <a:p>
-            <a:pPr lvl="2" eaLnBrk="1" hangingPunct="1">
-              <a:lnSpc>
-                <a:spcPct val="90000"/>
-              </a:lnSpc>
-            </a:pPr>
-            <a:r>
-              <a:rPr lang="en-US" altLang="en-US" sz="2000">
-                <a:ea typeface="ＭＳ Ｐゴシック" panose="020B0600070205080204" pitchFamily="34" charset="-128"/>
-              </a:rPr>
-              <a:t>rather than use finite-difference approximations, better to just use a derivative-free optimization algorithm</a:t>
-            </a:r>
-          </a:p>
-          <a:p>
-            <a:pPr lvl="2" eaLnBrk="1" hangingPunct="1">
-              <a:lnSpc>
-                <a:spcPct val="90000"/>
-              </a:lnSpc>
-            </a:pPr>
-            <a:r>
-              <a:rPr lang="en-US" altLang="en-US" sz="2000">
-                <a:ea typeface="ＭＳ Ｐゴシック" panose="020B0600070205080204" pitchFamily="34" charset="-128"/>
-              </a:rPr>
-              <a:t>in principle, one can always compute </a:t>
-            </a:r>
-            <a:r>
-              <a:rPr lang="en-US" altLang="en-US" sz="2000">
-                <a:ea typeface="ＭＳ Ｐゴシック" panose="020B0600070205080204" pitchFamily="34" charset="-128"/>
-                <a:sym typeface="Symbol" pitchFamily="2" charset="2"/>
-              </a:rPr>
-              <a:t></a:t>
-            </a:r>
-            <a:r>
-              <a:rPr lang="en-US" altLang="en-US" sz="2000" i="1" baseline="-25000">
-                <a:ea typeface="ＭＳ Ｐゴシック" panose="020B0600070205080204" pitchFamily="34" charset="-128"/>
-                <a:sym typeface="Symbol" pitchFamily="2" charset="2"/>
-              </a:rPr>
-              <a:t>x</a:t>
-            </a:r>
-            <a:r>
-              <a:rPr lang="en-US" altLang="en-US" sz="2000" i="1">
-                <a:ea typeface="ＭＳ Ｐゴシック" panose="020B0600070205080204" pitchFamily="34" charset="-128"/>
-                <a:sym typeface="Symbol" pitchFamily="2" charset="2"/>
-              </a:rPr>
-              <a:t>f</a:t>
-            </a:r>
-            <a:r>
-              <a:rPr lang="en-US" altLang="en-US" sz="2000" i="1" baseline="-25000">
-                <a:ea typeface="ＭＳ Ｐゴシック" panose="020B0600070205080204" pitchFamily="34" charset="-128"/>
-                <a:sym typeface="Symbol" pitchFamily="2" charset="2"/>
-              </a:rPr>
-              <a:t>i</a:t>
-            </a:r>
-            <a:r>
-              <a:rPr lang="en-US" altLang="en-US" sz="2000">
-                <a:ea typeface="ＭＳ Ｐゴシック" panose="020B0600070205080204" pitchFamily="34" charset="-128"/>
-              </a:rPr>
-              <a:t> with about the same cost as </a:t>
-            </a:r>
-            <a:r>
-              <a:rPr lang="en-US" altLang="en-US" sz="2000" i="1">
-                <a:ea typeface="ＭＳ Ｐゴシック" panose="020B0600070205080204" pitchFamily="34" charset="-128"/>
-              </a:rPr>
-              <a:t>f</a:t>
-            </a:r>
-            <a:r>
-              <a:rPr lang="en-US" altLang="en-US" sz="2000" i="1" baseline="-25000">
-                <a:ea typeface="ＭＳ Ｐゴシック" panose="020B0600070205080204" pitchFamily="34" charset="-128"/>
-              </a:rPr>
-              <a:t>i</a:t>
-            </a:r>
-            <a:r>
-              <a:rPr lang="en-US" altLang="en-US" sz="2000">
-                <a:ea typeface="ＭＳ Ｐゴシック" panose="020B0600070205080204" pitchFamily="34" charset="-128"/>
-              </a:rPr>
-              <a:t>, using </a:t>
-            </a:r>
-            <a:r>
-              <a:rPr lang="en-US" altLang="en-US" sz="2000">
-                <a:solidFill>
-                  <a:srgbClr val="FF0000"/>
-                </a:solidFill>
-                <a:ea typeface="ＭＳ Ｐゴシック" panose="020B0600070205080204" pitchFamily="34" charset="-128"/>
-              </a:rPr>
-              <a:t>adjoint methods</a:t>
-            </a:r>
-            <a:endParaRPr lang="en-US" altLang="en-US" sz="2000">
-              <a:ea typeface="ＭＳ Ｐゴシック" panose="020B0600070205080204" pitchFamily="34" charset="-128"/>
-            </a:endParaRPr>
-          </a:p>
-          <a:p>
-            <a:pPr lvl="1" eaLnBrk="1" hangingPunct="1">
-              <a:lnSpc>
-                <a:spcPct val="90000"/>
-              </a:lnSpc>
-            </a:pPr>
-            <a:r>
-              <a:rPr lang="en-US" altLang="en-US" sz="2400">
-                <a:ea typeface="ＭＳ Ｐゴシック" panose="020B0600070205080204" pitchFamily="34" charset="-128"/>
-              </a:rPr>
-              <a:t>gradient-based methods can find (local) optima of problems with millions of design parameters</a:t>
-            </a:r>
-          </a:p>
-          <a:p>
-            <a:pPr eaLnBrk="1" hangingPunct="1">
-              <a:lnSpc>
-                <a:spcPct val="90000"/>
-              </a:lnSpc>
-            </a:pPr>
-            <a:r>
-              <a:rPr lang="en-US" altLang="en-US" sz="2800">
-                <a:solidFill>
-                  <a:schemeClr val="accent2"/>
-                </a:solidFill>
-              </a:rPr>
-              <a:t>Derivative-free</a:t>
-            </a:r>
-            <a:r>
-              <a:rPr lang="en-US" altLang="en-US" sz="2800"/>
-              <a:t> methods: only require </a:t>
-            </a:r>
-            <a:r>
-              <a:rPr lang="en-US" altLang="en-US" sz="2800" i="1"/>
-              <a:t>f</a:t>
-            </a:r>
-            <a:r>
-              <a:rPr lang="en-US" altLang="en-US" sz="2800" i="1" baseline="-25000"/>
-              <a:t>i</a:t>
-            </a:r>
-            <a:r>
-              <a:rPr lang="en-US" altLang="en-US" sz="2800"/>
-              <a:t> values</a:t>
-            </a:r>
-          </a:p>
-          <a:p>
-            <a:pPr lvl="1" eaLnBrk="1" hangingPunct="1">
-              <a:lnSpc>
-                <a:spcPct val="90000"/>
-              </a:lnSpc>
-            </a:pPr>
-            <a:r>
-              <a:rPr lang="en-US" altLang="en-US" sz="2400">
-                <a:ea typeface="ＭＳ Ｐゴシック" panose="020B0600070205080204" pitchFamily="34" charset="-128"/>
-              </a:rPr>
-              <a:t>easier to use, can work with complicated “black-box” functions where computing gradients is inconvenient</a:t>
-            </a:r>
-          </a:p>
-          <a:p>
-            <a:pPr lvl="1" eaLnBrk="1" hangingPunct="1">
-              <a:lnSpc>
-                <a:spcPct val="90000"/>
-              </a:lnSpc>
-            </a:pPr>
-            <a:r>
-              <a:rPr lang="en-US" altLang="en-US" sz="2400" i="1">
-                <a:ea typeface="ＭＳ Ｐゴシック" panose="020B0600070205080204" pitchFamily="34" charset="-128"/>
-              </a:rPr>
-              <a:t>may</a:t>
-            </a:r>
-            <a:r>
-              <a:rPr lang="en-US" altLang="en-US" sz="2400">
-                <a:ea typeface="ＭＳ Ｐゴシック" panose="020B0600070205080204" pitchFamily="34" charset="-128"/>
-              </a:rPr>
-              <a:t> be only possibility for nondifferentiable problems</a:t>
-            </a:r>
-          </a:p>
-          <a:p>
-            <a:pPr lvl="1" eaLnBrk="1" hangingPunct="1">
-              <a:lnSpc>
-                <a:spcPct val="90000"/>
-              </a:lnSpc>
-            </a:pPr>
-            <a:r>
-              <a:rPr lang="en-US" altLang="en-US" sz="2400">
-                <a:ea typeface="ＭＳ Ｐゴシック" panose="020B0600070205080204" pitchFamily="34" charset="-128"/>
-              </a:rPr>
-              <a:t>need &gt; </a:t>
-            </a:r>
-            <a:r>
-              <a:rPr lang="en-US" altLang="en-US" sz="2400" i="1">
-                <a:ea typeface="ＭＳ Ｐゴシック" panose="020B0600070205080204" pitchFamily="34" charset="-128"/>
-              </a:rPr>
-              <a:t>n</a:t>
-            </a:r>
-            <a:r>
-              <a:rPr lang="en-US" altLang="en-US" sz="2400">
-                <a:ea typeface="ＭＳ Ｐゴシック" panose="020B0600070205080204" pitchFamily="34" charset="-128"/>
-              </a:rPr>
-              <a:t> function evaluations, bad for large </a:t>
-            </a:r>
-            <a:r>
-              <a:rPr lang="en-US" altLang="en-US" sz="2400" i="1">
-                <a:ea typeface="ＭＳ Ｐゴシック" panose="020B0600070205080204" pitchFamily="34" charset="-128"/>
-              </a:rPr>
-              <a:t>n</a:t>
-            </a:r>
-            <a:endParaRPr lang="en-US" altLang="en-US" sz="2400">
-              <a:ea typeface="ＭＳ Ｐゴシック" panose="020B0600070205080204" pitchFamily="34" charset="-128"/>
-            </a:endParaRPr>
           </a:p>
         </p:txBody>
       </p:sp>

</xml_diff>